<commit_message>
Updated progress through 8-27-2020 but less coherent than first try
</commit_message>
<xml_diff>
--- a/Diurnal and Low Frequency Northward Winds off Chile.pptx
+++ b/Diurnal and Low Frequency Northward Winds off Chile.pptx
@@ -5,7 +5,7 @@
     <p:sldMasterId id="2147483852" r:id="rId1"/>
   </p:sldMasterIdLst>
   <p:notesMasterIdLst>
-    <p:notesMasterId r:id="rId15"/>
+    <p:notesMasterId r:id="rId17"/>
   </p:notesMasterIdLst>
   <p:sldIdLst>
     <p:sldId id="256" r:id="rId2"/>
@@ -21,6 +21,8 @@
     <p:sldId id="264" r:id="rId12"/>
     <p:sldId id="262" r:id="rId13"/>
     <p:sldId id="268" r:id="rId14"/>
+    <p:sldId id="269" r:id="rId15"/>
+    <p:sldId id="270" r:id="rId16"/>
   </p:sldIdLst>
   <p:sldSz cx="12192000" cy="6858000"/>
   <p:notesSz cx="6858000" cy="9144000"/>
@@ -385,7 +387,7 @@
           <a:p>
             <a:fld id="{4215EA97-1EC7-4F85-A8C4-247139B65AC9}" type="datetimeFigureOut">
               <a:rPr lang="en-US" smtClean="0"/>
-              <a:t>7/2/2020</a:t>
+              <a:t>8/27/2020</a:t>
             </a:fld>
             <a:endParaRPr lang="en-US"/>
           </a:p>
@@ -854,6 +856,185 @@
 </p:notes>
 </file>
 
+<file path=ppt/notesSlides/notesSlide3.xml><?xml version="1.0" encoding="utf-8"?>
+<p:notes xmlns:a="http://schemas.openxmlformats.org/drawingml/2006/main" xmlns:r="http://schemas.openxmlformats.org/officeDocument/2006/relationships" xmlns:p="http://schemas.openxmlformats.org/presentationml/2006/main">
+  <p:cSld>
+    <p:spTree>
+      <p:nvGrpSpPr>
+        <p:cNvPr id="1" name=""/>
+        <p:cNvGrpSpPr/>
+        <p:nvPr/>
+      </p:nvGrpSpPr>
+      <p:grpSpPr>
+        <a:xfrm>
+          <a:off x="0" y="0"/>
+          <a:ext cx="0" cy="0"/>
+          <a:chOff x="0" y="0"/>
+          <a:chExt cx="0" cy="0"/>
+        </a:xfrm>
+      </p:grpSpPr>
+      <p:sp>
+        <p:nvSpPr>
+          <p:cNvPr id="2" name="Slide Image Placeholder 1"/>
+          <p:cNvSpPr>
+            <a:spLocks noGrp="1" noRot="1" noChangeAspect="1"/>
+          </p:cNvSpPr>
+          <p:nvPr>
+            <p:ph type="sldImg"/>
+          </p:nvPr>
+        </p:nvSpPr>
+        <p:spPr/>
+      </p:sp>
+      <p:sp>
+        <p:nvSpPr>
+          <p:cNvPr id="3" name="Notes Placeholder 2"/>
+          <p:cNvSpPr>
+            <a:spLocks noGrp="1"/>
+          </p:cNvSpPr>
+          <p:nvPr>
+            <p:ph type="body" idx="1"/>
+          </p:nvPr>
+        </p:nvSpPr>
+        <p:spPr/>
+        <p:txBody>
+          <a:bodyPr/>
+          <a:lstStyle/>
+          <a:p>
+            <a:r>
+              <a:rPr lang="en-US" dirty="0"/>
+              <a:t>This N* is useful for confidence intervals of independent synoptic-band events</a:t>
+            </a:r>
+          </a:p>
+        </p:txBody>
+      </p:sp>
+      <p:sp>
+        <p:nvSpPr>
+          <p:cNvPr id="4" name="Slide Number Placeholder 3"/>
+          <p:cNvSpPr>
+            <a:spLocks noGrp="1"/>
+          </p:cNvSpPr>
+          <p:nvPr>
+            <p:ph type="sldNum" sz="quarter" idx="5"/>
+          </p:nvPr>
+        </p:nvSpPr>
+        <p:spPr/>
+        <p:txBody>
+          <a:bodyPr/>
+          <a:lstStyle/>
+          <a:p>
+            <a:fld id="{28DA9E86-D76E-4569-9EA2-B7BB8F3430A8}" type="slidenum">
+              <a:rPr lang="en-US" smtClean="0"/>
+              <a:t>14</a:t>
+            </a:fld>
+            <a:endParaRPr lang="en-US"/>
+          </a:p>
+        </p:txBody>
+      </p:sp>
+    </p:spTree>
+    <p:extLst>
+      <p:ext uri="{BB962C8B-B14F-4D97-AF65-F5344CB8AC3E}">
+        <p14:creationId xmlns:p14="http://schemas.microsoft.com/office/powerpoint/2010/main" val="4221826256"/>
+      </p:ext>
+    </p:extLst>
+  </p:cSld>
+  <p:clrMapOvr>
+    <a:masterClrMapping/>
+  </p:clrMapOvr>
+</p:notes>
+</file>
+
+<file path=ppt/notesSlides/notesSlide4.xml><?xml version="1.0" encoding="utf-8"?>
+<p:notes xmlns:a="http://schemas.openxmlformats.org/drawingml/2006/main" xmlns:r="http://schemas.openxmlformats.org/officeDocument/2006/relationships" xmlns:p="http://schemas.openxmlformats.org/presentationml/2006/main">
+  <p:cSld>
+    <p:spTree>
+      <p:nvGrpSpPr>
+        <p:cNvPr id="1" name=""/>
+        <p:cNvGrpSpPr/>
+        <p:nvPr/>
+      </p:nvGrpSpPr>
+      <p:grpSpPr>
+        <a:xfrm>
+          <a:off x="0" y="0"/>
+          <a:ext cx="0" cy="0"/>
+          <a:chOff x="0" y="0"/>
+          <a:chExt cx="0" cy="0"/>
+        </a:xfrm>
+      </p:grpSpPr>
+      <p:sp>
+        <p:nvSpPr>
+          <p:cNvPr id="2" name="Slide Image Placeholder 1"/>
+          <p:cNvSpPr>
+            <a:spLocks noGrp="1" noRot="1" noChangeAspect="1"/>
+          </p:cNvSpPr>
+          <p:nvPr>
+            <p:ph type="sldImg"/>
+          </p:nvPr>
+        </p:nvSpPr>
+        <p:spPr/>
+      </p:sp>
+      <p:sp>
+        <p:nvSpPr>
+          <p:cNvPr id="3" name="Notes Placeholder 2"/>
+          <p:cNvSpPr>
+            <a:spLocks noGrp="1"/>
+          </p:cNvSpPr>
+          <p:nvPr>
+            <p:ph type="body" idx="1"/>
+          </p:nvPr>
+        </p:nvSpPr>
+        <p:spPr/>
+        <p:txBody>
+          <a:bodyPr/>
+          <a:lstStyle/>
+          <a:p>
+            <a:r>
+              <a:rPr lang="en-US" dirty="0"/>
+              <a:t>N* for independent events on diurnal </a:t>
+            </a:r>
+            <a:r>
+              <a:rPr lang="en-US"/>
+              <a:t>time scales.</a:t>
+            </a:r>
+            <a:endParaRPr lang="en-US" dirty="0"/>
+          </a:p>
+        </p:txBody>
+      </p:sp>
+      <p:sp>
+        <p:nvSpPr>
+          <p:cNvPr id="4" name="Slide Number Placeholder 3"/>
+          <p:cNvSpPr>
+            <a:spLocks noGrp="1"/>
+          </p:cNvSpPr>
+          <p:nvPr>
+            <p:ph type="sldNum" sz="quarter" idx="5"/>
+          </p:nvPr>
+        </p:nvSpPr>
+        <p:spPr/>
+        <p:txBody>
+          <a:bodyPr/>
+          <a:lstStyle/>
+          <a:p>
+            <a:fld id="{28DA9E86-D76E-4569-9EA2-B7BB8F3430A8}" type="slidenum">
+              <a:rPr lang="en-US" smtClean="0"/>
+              <a:t>15</a:t>
+            </a:fld>
+            <a:endParaRPr lang="en-US"/>
+          </a:p>
+        </p:txBody>
+      </p:sp>
+    </p:spTree>
+    <p:extLst>
+      <p:ext uri="{BB962C8B-B14F-4D97-AF65-F5344CB8AC3E}">
+        <p14:creationId xmlns:p14="http://schemas.microsoft.com/office/powerpoint/2010/main" val="610623422"/>
+      </p:ext>
+    </p:extLst>
+  </p:cSld>
+  <p:clrMapOvr>
+    <a:masterClrMapping/>
+  </p:clrMapOvr>
+</p:notes>
+</file>
+
 <file path=ppt/slideLayouts/slideLayout1.xml><?xml version="1.0" encoding="utf-8"?>
 <p:sldLayout xmlns:a="http://schemas.openxmlformats.org/drawingml/2006/main" xmlns:r="http://schemas.openxmlformats.org/officeDocument/2006/relationships" xmlns:p="http://schemas.openxmlformats.org/presentationml/2006/main" type="title" preserve="1">
   <p:cSld name="Title Slide">
@@ -1002,7 +1183,7 @@
             <a:fld id="{5586B75A-687E-405C-8A0B-8D00578BA2C3}" type="datetimeFigureOut">
               <a:rPr lang="en-US" smtClean="0"/>
               <a:pPr/>
-              <a:t>7/2/2020</a:t>
+              <a:t>8/27/2020</a:t>
             </a:fld>
             <a:endParaRPr lang="en-US" dirty="0"/>
           </a:p>
@@ -1202,7 +1383,7 @@
             <a:fld id="{5586B75A-687E-405C-8A0B-8D00578BA2C3}" type="datetimeFigureOut">
               <a:rPr lang="en-US" smtClean="0"/>
               <a:pPr/>
-              <a:t>7/2/2020</a:t>
+              <a:t>8/27/2020</a:t>
             </a:fld>
             <a:endParaRPr lang="en-US" dirty="0"/>
           </a:p>
@@ -1412,7 +1593,7 @@
             <a:fld id="{5586B75A-687E-405C-8A0B-8D00578BA2C3}" type="datetimeFigureOut">
               <a:rPr lang="en-US" smtClean="0"/>
               <a:pPr/>
-              <a:t>7/2/2020</a:t>
+              <a:t>8/27/2020</a:t>
             </a:fld>
             <a:endParaRPr lang="en-US" dirty="0"/>
           </a:p>
@@ -1612,7 +1793,7 @@
             <a:fld id="{5586B75A-687E-405C-8A0B-8D00578BA2C3}" type="datetimeFigureOut">
               <a:rPr lang="en-US" smtClean="0"/>
               <a:pPr/>
-              <a:t>7/2/2020</a:t>
+              <a:t>8/27/2020</a:t>
             </a:fld>
             <a:endParaRPr lang="en-US" dirty="0"/>
           </a:p>
@@ -1889,7 +2070,7 @@
             <a:fld id="{5586B75A-687E-405C-8A0B-8D00578BA2C3}" type="datetimeFigureOut">
               <a:rPr lang="en-US" smtClean="0"/>
               <a:pPr/>
-              <a:t>7/2/2020</a:t>
+              <a:t>8/27/2020</a:t>
             </a:fld>
             <a:endParaRPr lang="en-US" dirty="0"/>
           </a:p>
@@ -2156,7 +2337,7 @@
             <a:fld id="{5586B75A-687E-405C-8A0B-8D00578BA2C3}" type="datetimeFigureOut">
               <a:rPr lang="en-US" smtClean="0"/>
               <a:pPr/>
-              <a:t>7/2/2020</a:t>
+              <a:t>8/27/2020</a:t>
             </a:fld>
             <a:endParaRPr lang="en-US" dirty="0"/>
           </a:p>
@@ -2570,7 +2751,7 @@
             <a:fld id="{5586B75A-687E-405C-8A0B-8D00578BA2C3}" type="datetimeFigureOut">
               <a:rPr lang="en-US" smtClean="0"/>
               <a:pPr/>
-              <a:t>7/2/2020</a:t>
+              <a:t>8/27/2020</a:t>
             </a:fld>
             <a:endParaRPr lang="en-US" dirty="0"/>
           </a:p>
@@ -2713,7 +2894,7 @@
             <a:fld id="{5586B75A-687E-405C-8A0B-8D00578BA2C3}" type="datetimeFigureOut">
               <a:rPr lang="en-US" smtClean="0"/>
               <a:pPr/>
-              <a:t>7/2/2020</a:t>
+              <a:t>8/27/2020</a:t>
             </a:fld>
             <a:endParaRPr lang="en-US" dirty="0"/>
           </a:p>
@@ -2828,7 +3009,7 @@
             <a:fld id="{5586B75A-687E-405C-8A0B-8D00578BA2C3}" type="datetimeFigureOut">
               <a:rPr lang="en-US" smtClean="0"/>
               <a:pPr/>
-              <a:t>7/2/2020</a:t>
+              <a:t>8/27/2020</a:t>
             </a:fld>
             <a:endParaRPr lang="en-US" dirty="0"/>
           </a:p>
@@ -3141,7 +3322,7 @@
             <a:fld id="{5586B75A-687E-405C-8A0B-8D00578BA2C3}" type="datetimeFigureOut">
               <a:rPr lang="en-US" smtClean="0"/>
               <a:pPr/>
-              <a:t>7/2/2020</a:t>
+              <a:t>8/27/2020</a:t>
             </a:fld>
             <a:endParaRPr lang="en-US" dirty="0"/>
           </a:p>
@@ -3431,7 +3612,7 @@
             <a:fld id="{5586B75A-687E-405C-8A0B-8D00578BA2C3}" type="datetimeFigureOut">
               <a:rPr lang="en-US" smtClean="0"/>
               <a:pPr/>
-              <a:t>7/2/2020</a:t>
+              <a:t>8/27/2020</a:t>
             </a:fld>
             <a:endParaRPr lang="en-US" dirty="0"/>
           </a:p>
@@ -3680,7 +3861,7 @@
             <a:fld id="{5586B75A-687E-405C-8A0B-8D00578BA2C3}" type="datetimeFigureOut">
               <a:rPr lang="en-US" smtClean="0"/>
               <a:pPr/>
-              <a:t>7/2/2020</a:t>
+              <a:t>8/27/2020</a:t>
             </a:fld>
             <a:endParaRPr lang="en-US" dirty="0"/>
           </a:p>
@@ -4495,8 +4676,8 @@
           </a:p>
         </p:txBody>
       </p:sp>
-      <mc:AlternateContent xmlns:mc="http://schemas.openxmlformats.org/markup-compatibility/2006">
-        <mc:Choice xmlns:a14="http://schemas.microsoft.com/office/drawing/2010/main" Requires="a14">
+      <mc:AlternateContent xmlns:mc="http://schemas.openxmlformats.org/markup-compatibility/2006" xmlns:a14="http://schemas.microsoft.com/office/drawing/2010/main">
+        <mc:Choice Requires="a14">
           <p:sp>
             <p:nvSpPr>
               <p:cNvPr id="3" name="Content Placeholder 2">
@@ -5054,7 +5235,7 @@
             </p:txBody>
           </p:sp>
         </mc:Choice>
-        <mc:Fallback>
+        <mc:Fallback xmlns="">
           <p:sp>
             <p:nvSpPr>
               <p:cNvPr id="3" name="Content Placeholder 2">
@@ -5532,6 +5713,287 @@
     <p:extLst>
       <p:ext uri="{BB962C8B-B14F-4D97-AF65-F5344CB8AC3E}">
         <p14:creationId xmlns:p14="http://schemas.microsoft.com/office/powerpoint/2010/main" val="74155334"/>
+      </p:ext>
+    </p:extLst>
+  </p:cSld>
+  <p:clrMapOvr>
+    <a:masterClrMapping/>
+  </p:clrMapOvr>
+</p:sld>
+</file>
+
+<file path=ppt/slides/slide14.xml><?xml version="1.0" encoding="utf-8"?>
+<p:sld xmlns:a="http://schemas.openxmlformats.org/drawingml/2006/main" xmlns:r="http://schemas.openxmlformats.org/officeDocument/2006/relationships" xmlns:p="http://schemas.openxmlformats.org/presentationml/2006/main">
+  <p:cSld>
+    <p:spTree>
+      <p:nvGrpSpPr>
+        <p:cNvPr id="1" name=""/>
+        <p:cNvGrpSpPr/>
+        <p:nvPr/>
+      </p:nvGrpSpPr>
+      <p:grpSpPr>
+        <a:xfrm>
+          <a:off x="0" y="0"/>
+          <a:ext cx="0" cy="0"/>
+          <a:chOff x="0" y="0"/>
+          <a:chExt cx="0" cy="0"/>
+        </a:xfrm>
+      </p:grpSpPr>
+      <p:sp>
+        <p:nvSpPr>
+          <p:cNvPr id="2" name="Title 1">
+            <a:extLst>
+              <a:ext uri="{FF2B5EF4-FFF2-40B4-BE49-F238E27FC236}">
+                <a16:creationId xmlns:a16="http://schemas.microsoft.com/office/drawing/2014/main" id="{233CA4CD-A43C-446C-81DF-75A11F1CBE40}"/>
+              </a:ext>
+            </a:extLst>
+          </p:cNvPr>
+          <p:cNvSpPr>
+            <a:spLocks noGrp="1"/>
+          </p:cNvSpPr>
+          <p:nvPr>
+            <p:ph type="title"/>
+          </p:nvPr>
+        </p:nvSpPr>
+        <p:spPr/>
+        <p:txBody>
+          <a:bodyPr/>
+          <a:lstStyle/>
+          <a:p>
+            <a:r>
+              <a:rPr lang="en-US" dirty="0"/>
+              <a:t>N* from Autocorrelation</a:t>
+            </a:r>
+          </a:p>
+        </p:txBody>
+      </p:sp>
+      <p:pic>
+        <p:nvPicPr>
+          <p:cNvPr id="6" name="Content Placeholder 5">
+            <a:extLst>
+              <a:ext uri="{FF2B5EF4-FFF2-40B4-BE49-F238E27FC236}">
+                <a16:creationId xmlns:a16="http://schemas.microsoft.com/office/drawing/2014/main" id="{84562BF0-B257-4AED-8E21-DDEEAD5021BC}"/>
+              </a:ext>
+            </a:extLst>
+          </p:cNvPr>
+          <p:cNvPicPr>
+            <a:picLocks noGrp="1" noChangeAspect="1"/>
+          </p:cNvPicPr>
+          <p:nvPr>
+            <p:ph idx="1"/>
+          </p:nvPr>
+        </p:nvPicPr>
+        <p:blipFill>
+          <a:blip r:embed="rId3"/>
+          <a:stretch>
+            <a:fillRect/>
+          </a:stretch>
+        </p:blipFill>
+        <p:spPr>
+          <a:xfrm>
+            <a:off x="5172200" y="265023"/>
+            <a:ext cx="6514783" cy="3163978"/>
+          </a:xfrm>
+        </p:spPr>
+      </p:pic>
+      <p:sp>
+        <p:nvSpPr>
+          <p:cNvPr id="4" name="Text Placeholder 3">
+            <a:extLst>
+              <a:ext uri="{FF2B5EF4-FFF2-40B4-BE49-F238E27FC236}">
+                <a16:creationId xmlns:a16="http://schemas.microsoft.com/office/drawing/2014/main" id="{E8A9B001-541F-4A54-BF0C-7BE106612242}"/>
+              </a:ext>
+            </a:extLst>
+          </p:cNvPr>
+          <p:cNvSpPr>
+            <a:spLocks noGrp="1"/>
+          </p:cNvSpPr>
+          <p:nvPr>
+            <p:ph type="body" sz="half" idx="2"/>
+          </p:nvPr>
+        </p:nvSpPr>
+        <p:spPr/>
+        <p:txBody>
+          <a:bodyPr/>
+          <a:lstStyle/>
+          <a:p>
+            <a:r>
+              <a:rPr lang="en-US" dirty="0"/>
+              <a:t>Using “rule of thumb”:</a:t>
+            </a:r>
+          </a:p>
+          <a:p>
+            <a:r>
+              <a:rPr lang="en-US" dirty="0"/>
+              <a:t>T = 90934 hours</a:t>
+            </a:r>
+          </a:p>
+          <a:p>
+            <a:r>
+              <a:rPr lang="en-US" dirty="0"/>
+              <a:t>\</a:t>
+            </a:r>
+            <a:r>
+              <a:rPr lang="en-US" dirty="0" err="1"/>
+              <a:t>tau^ind</a:t>
+            </a:r>
+            <a:r>
+              <a:rPr lang="en-US" dirty="0"/>
+              <a:t> = 26 hours for entire time series and low-passed signal</a:t>
+            </a:r>
+          </a:p>
+          <a:p>
+            <a:r>
+              <a:rPr lang="en-US" dirty="0"/>
+              <a:t>N* = 350 </a:t>
+            </a:r>
+            <a:r>
+              <a:rPr lang="en-US" dirty="0" err="1"/>
+              <a:t>ish</a:t>
+            </a:r>
+            <a:endParaRPr lang="en-US" dirty="0"/>
+          </a:p>
+          <a:p>
+            <a:endParaRPr lang="en-US" dirty="0"/>
+          </a:p>
+        </p:txBody>
+      </p:sp>
+      <p:pic>
+        <p:nvPicPr>
+          <p:cNvPr id="8" name="Picture 7">
+            <a:extLst>
+              <a:ext uri="{FF2B5EF4-FFF2-40B4-BE49-F238E27FC236}">
+                <a16:creationId xmlns:a16="http://schemas.microsoft.com/office/drawing/2014/main" id="{0C9DFE66-6683-444A-A4F0-7FF1A9977F81}"/>
+              </a:ext>
+            </a:extLst>
+          </p:cNvPr>
+          <p:cNvPicPr>
+            <a:picLocks noChangeAspect="1"/>
+          </p:cNvPicPr>
+          <p:nvPr/>
+        </p:nvPicPr>
+        <p:blipFill>
+          <a:blip r:embed="rId4"/>
+          <a:stretch>
+            <a:fillRect/>
+          </a:stretch>
+        </p:blipFill>
+        <p:spPr>
+          <a:xfrm>
+            <a:off x="5172200" y="3594591"/>
+            <a:ext cx="6514783" cy="2997599"/>
+          </a:xfrm>
+          <a:prstGeom prst="rect">
+            <a:avLst/>
+          </a:prstGeom>
+        </p:spPr>
+      </p:pic>
+    </p:spTree>
+    <p:extLst>
+      <p:ext uri="{BB962C8B-B14F-4D97-AF65-F5344CB8AC3E}">
+        <p14:creationId xmlns:p14="http://schemas.microsoft.com/office/powerpoint/2010/main" val="249554216"/>
+      </p:ext>
+    </p:extLst>
+  </p:cSld>
+  <p:clrMapOvr>
+    <a:masterClrMapping/>
+  </p:clrMapOvr>
+</p:sld>
+</file>
+
+<file path=ppt/slides/slide15.xml><?xml version="1.0" encoding="utf-8"?>
+<p:sld xmlns:a="http://schemas.openxmlformats.org/drawingml/2006/main" xmlns:r="http://schemas.openxmlformats.org/officeDocument/2006/relationships" xmlns:p="http://schemas.openxmlformats.org/presentationml/2006/main">
+  <p:cSld>
+    <p:spTree>
+      <p:nvGrpSpPr>
+        <p:cNvPr id="1" name=""/>
+        <p:cNvGrpSpPr/>
+        <p:nvPr/>
+      </p:nvGrpSpPr>
+      <p:grpSpPr>
+        <a:xfrm>
+          <a:off x="0" y="0"/>
+          <a:ext cx="0" cy="0"/>
+          <a:chOff x="0" y="0"/>
+          <a:chExt cx="0" cy="0"/>
+        </a:xfrm>
+      </p:grpSpPr>
+      <p:sp>
+        <p:nvSpPr>
+          <p:cNvPr id="2" name="Title 1">
+            <a:extLst>
+              <a:ext uri="{FF2B5EF4-FFF2-40B4-BE49-F238E27FC236}">
+                <a16:creationId xmlns:a16="http://schemas.microsoft.com/office/drawing/2014/main" id="{61C8800C-6714-4BE1-883C-1663F95B79C4}"/>
+              </a:ext>
+            </a:extLst>
+          </p:cNvPr>
+          <p:cNvSpPr>
+            <a:spLocks noGrp="1"/>
+          </p:cNvSpPr>
+          <p:nvPr>
+            <p:ph type="title"/>
+          </p:nvPr>
+        </p:nvSpPr>
+        <p:spPr/>
+        <p:txBody>
+          <a:bodyPr/>
+          <a:lstStyle/>
+          <a:p>
+            <a:r>
+              <a:rPr lang="en-US" dirty="0"/>
+              <a:t>In contrast with the high-passed \</a:t>
+            </a:r>
+            <a:r>
+              <a:rPr lang="en-US" dirty="0" err="1"/>
+              <a:t>tau^ind</a:t>
+            </a:r>
+            <a:r>
+              <a:rPr lang="en-US" dirty="0"/>
+              <a:t> =38</a:t>
+            </a:r>
+            <a:br>
+              <a:rPr lang="en-US" dirty="0"/>
+            </a:br>
+            <a:r>
+              <a:rPr lang="en-US" dirty="0"/>
+              <a:t>N* = 2393</a:t>
+            </a:r>
+          </a:p>
+        </p:txBody>
+      </p:sp>
+      <p:pic>
+        <p:nvPicPr>
+          <p:cNvPr id="5" name="Content Placeholder 4">
+            <a:extLst>
+              <a:ext uri="{FF2B5EF4-FFF2-40B4-BE49-F238E27FC236}">
+                <a16:creationId xmlns:a16="http://schemas.microsoft.com/office/drawing/2014/main" id="{BB3C4978-1270-4D86-8105-650D75762C9A}"/>
+              </a:ext>
+            </a:extLst>
+          </p:cNvPr>
+          <p:cNvPicPr>
+            <a:picLocks noGrp="1" noChangeAspect="1"/>
+          </p:cNvPicPr>
+          <p:nvPr>
+            <p:ph idx="1"/>
+          </p:nvPr>
+        </p:nvPicPr>
+        <p:blipFill>
+          <a:blip r:embed="rId3"/>
+          <a:stretch>
+            <a:fillRect/>
+          </a:stretch>
+        </p:blipFill>
+        <p:spPr>
+          <a:xfrm>
+            <a:off x="838200" y="1889324"/>
+            <a:ext cx="10515600" cy="4223940"/>
+          </a:xfrm>
+        </p:spPr>
+      </p:pic>
+    </p:spTree>
+    <p:extLst>
+      <p:ext uri="{BB962C8B-B14F-4D97-AF65-F5344CB8AC3E}">
+        <p14:creationId xmlns:p14="http://schemas.microsoft.com/office/powerpoint/2010/main" val="3578214222"/>
       </p:ext>
     </p:extLst>
   </p:cSld>

</xml_diff>

<commit_message>
Updating with all progress through 8-27-2020
</commit_message>
<xml_diff>
--- a/Diurnal and Low Frequency Northward Winds off Chile.pptx
+++ b/Diurnal and Low Frequency Northward Winds off Chile.pptx
@@ -5,7 +5,7 @@
     <p:sldMasterId id="2147483852" r:id="rId1"/>
   </p:sldMasterIdLst>
   <p:notesMasterIdLst>
-    <p:notesMasterId r:id="rId17"/>
+    <p:notesMasterId r:id="rId18"/>
   </p:notesMasterIdLst>
   <p:sldIdLst>
     <p:sldId id="256" r:id="rId2"/>
@@ -23,6 +23,7 @@
     <p:sldId id="268" r:id="rId14"/>
     <p:sldId id="269" r:id="rId15"/>
     <p:sldId id="270" r:id="rId16"/>
+    <p:sldId id="271" r:id="rId17"/>
   </p:sldIdLst>
   <p:sldSz cx="12192000" cy="6858000"/>
   <p:notesSz cx="6858000" cy="9144000"/>
@@ -1026,6 +1027,98 @@
     <p:extLst>
       <p:ext uri="{BB962C8B-B14F-4D97-AF65-F5344CB8AC3E}">
         <p14:creationId xmlns:p14="http://schemas.microsoft.com/office/powerpoint/2010/main" val="610623422"/>
+      </p:ext>
+    </p:extLst>
+  </p:cSld>
+  <p:clrMapOvr>
+    <a:masterClrMapping/>
+  </p:clrMapOvr>
+</p:notes>
+</file>
+
+<file path=ppt/notesSlides/notesSlide5.xml><?xml version="1.0" encoding="utf-8"?>
+<p:notes xmlns:a="http://schemas.openxmlformats.org/drawingml/2006/main" xmlns:r="http://schemas.openxmlformats.org/officeDocument/2006/relationships" xmlns:p="http://schemas.openxmlformats.org/presentationml/2006/main">
+  <p:cSld>
+    <p:spTree>
+      <p:nvGrpSpPr>
+        <p:cNvPr id="1" name=""/>
+        <p:cNvGrpSpPr/>
+        <p:nvPr/>
+      </p:nvGrpSpPr>
+      <p:grpSpPr>
+        <a:xfrm>
+          <a:off x="0" y="0"/>
+          <a:ext cx="0" cy="0"/>
+          <a:chOff x="0" y="0"/>
+          <a:chExt cx="0" cy="0"/>
+        </a:xfrm>
+      </p:grpSpPr>
+      <p:sp>
+        <p:nvSpPr>
+          <p:cNvPr id="2" name="Slide Image Placeholder 1"/>
+          <p:cNvSpPr>
+            <a:spLocks noGrp="1" noRot="1" noChangeAspect="1"/>
+          </p:cNvSpPr>
+          <p:nvPr>
+            <p:ph type="sldImg"/>
+          </p:nvPr>
+        </p:nvSpPr>
+        <p:spPr/>
+      </p:sp>
+      <p:sp>
+        <p:nvSpPr>
+          <p:cNvPr id="3" name="Notes Placeholder 2"/>
+          <p:cNvSpPr>
+            <a:spLocks noGrp="1"/>
+          </p:cNvSpPr>
+          <p:nvPr>
+            <p:ph type="body" idx="1"/>
+          </p:nvPr>
+        </p:nvSpPr>
+        <p:spPr/>
+        <p:txBody>
+          <a:bodyPr/>
+          <a:lstStyle/>
+          <a:p>
+            <a:r>
+              <a:rPr lang="en-US" dirty="0"/>
+              <a:t>Separately used the different N* values for each set of CI’s. Now they are much smaller that the standard deviation of the monthly mean from year to year. Will want to check the equation I used to calculate and an seek an explanation of its significance from </a:t>
+            </a:r>
+            <a:r>
+              <a:rPr lang="en-US"/>
+              <a:t>682 notes. </a:t>
+            </a:r>
+            <a:endParaRPr lang="en-US" dirty="0"/>
+          </a:p>
+        </p:txBody>
+      </p:sp>
+      <p:sp>
+        <p:nvSpPr>
+          <p:cNvPr id="4" name="Slide Number Placeholder 3"/>
+          <p:cNvSpPr>
+            <a:spLocks noGrp="1"/>
+          </p:cNvSpPr>
+          <p:nvPr>
+            <p:ph type="sldNum" sz="quarter" idx="5"/>
+          </p:nvPr>
+        </p:nvSpPr>
+        <p:spPr/>
+        <p:txBody>
+          <a:bodyPr/>
+          <a:lstStyle/>
+          <a:p>
+            <a:fld id="{28DA9E86-D76E-4569-9EA2-B7BB8F3430A8}" type="slidenum">
+              <a:rPr lang="en-US" smtClean="0"/>
+              <a:t>16</a:t>
+            </a:fld>
+            <a:endParaRPr lang="en-US"/>
+          </a:p>
+        </p:txBody>
+      </p:sp>
+    </p:spTree>
+    <p:extLst>
+      <p:ext uri="{BB962C8B-B14F-4D97-AF65-F5344CB8AC3E}">
+        <p14:creationId xmlns:p14="http://schemas.microsoft.com/office/powerpoint/2010/main" val="2536254327"/>
       </p:ext>
     </p:extLst>
   </p:cSld>
@@ -6003,6 +6096,100 @@
 </p:sld>
 </file>
 
+<file path=ppt/slides/slide16.xml><?xml version="1.0" encoding="utf-8"?>
+<p:sld xmlns:a="http://schemas.openxmlformats.org/drawingml/2006/main" xmlns:r="http://schemas.openxmlformats.org/officeDocument/2006/relationships" xmlns:p="http://schemas.openxmlformats.org/presentationml/2006/main">
+  <p:cSld>
+    <p:spTree>
+      <p:nvGrpSpPr>
+        <p:cNvPr id="1" name=""/>
+        <p:cNvGrpSpPr/>
+        <p:nvPr/>
+      </p:nvGrpSpPr>
+      <p:grpSpPr>
+        <a:xfrm>
+          <a:off x="0" y="0"/>
+          <a:ext cx="0" cy="0"/>
+          <a:chOff x="0" y="0"/>
+          <a:chExt cx="0" cy="0"/>
+        </a:xfrm>
+      </p:grpSpPr>
+      <p:sp>
+        <p:nvSpPr>
+          <p:cNvPr id="2" name="Title 1">
+            <a:extLst>
+              <a:ext uri="{FF2B5EF4-FFF2-40B4-BE49-F238E27FC236}">
+                <a16:creationId xmlns:a16="http://schemas.microsoft.com/office/drawing/2014/main" id="{76C7E056-82F5-4F63-ACB6-620BD504933F}"/>
+              </a:ext>
+            </a:extLst>
+          </p:cNvPr>
+          <p:cNvSpPr>
+            <a:spLocks noGrp="1"/>
+          </p:cNvSpPr>
+          <p:nvPr>
+            <p:ph type="title"/>
+          </p:nvPr>
+        </p:nvSpPr>
+        <p:spPr>
+          <a:xfrm>
+            <a:off x="542610" y="200968"/>
+            <a:ext cx="8581293" cy="625563"/>
+          </a:xfrm>
+        </p:spPr>
+        <p:txBody>
+          <a:bodyPr>
+            <a:normAutofit fontScale="90000"/>
+          </a:bodyPr>
+          <a:lstStyle/>
+          <a:p>
+            <a:r>
+              <a:rPr lang="en-US" dirty="0"/>
+              <a:t>Adjusted CI’s with new N*</a:t>
+            </a:r>
+          </a:p>
+        </p:txBody>
+      </p:sp>
+      <p:pic>
+        <p:nvPicPr>
+          <p:cNvPr id="5" name="Content Placeholder 4">
+            <a:extLst>
+              <a:ext uri="{FF2B5EF4-FFF2-40B4-BE49-F238E27FC236}">
+                <a16:creationId xmlns:a16="http://schemas.microsoft.com/office/drawing/2014/main" id="{D9B59A58-9CCF-4448-A1EA-ADBD25BA7F0D}"/>
+              </a:ext>
+            </a:extLst>
+          </p:cNvPr>
+          <p:cNvPicPr>
+            <a:picLocks noGrp="1" noChangeAspect="1"/>
+          </p:cNvPicPr>
+          <p:nvPr>
+            <p:ph idx="1"/>
+          </p:nvPr>
+        </p:nvPicPr>
+        <p:blipFill>
+          <a:blip r:embed="rId3"/>
+          <a:stretch>
+            <a:fillRect/>
+          </a:stretch>
+        </p:blipFill>
+        <p:spPr>
+          <a:xfrm>
+            <a:off x="388536" y="826531"/>
+            <a:ext cx="11414928" cy="5935762"/>
+          </a:xfrm>
+        </p:spPr>
+      </p:pic>
+    </p:spTree>
+    <p:extLst>
+      <p:ext uri="{BB962C8B-B14F-4D97-AF65-F5344CB8AC3E}">
+        <p14:creationId xmlns:p14="http://schemas.microsoft.com/office/powerpoint/2010/main" val="1326574310"/>
+      </p:ext>
+    </p:extLst>
+  </p:cSld>
+  <p:clrMapOvr>
+    <a:masterClrMapping/>
+  </p:clrMapOvr>
+</p:sld>
+</file>
+
 <file path=ppt/slides/slide2.xml><?xml version="1.0" encoding="utf-8"?>
 <p:sld xmlns:a="http://schemas.openxmlformats.org/drawingml/2006/main" xmlns:r="http://schemas.openxmlformats.org/officeDocument/2006/relationships" xmlns:p="http://schemas.openxmlformats.org/presentationml/2006/main" show="0">
   <p:cSld>

</xml_diff>

<commit_message>
Elaborating on new CI's in notes
</commit_message>
<xml_diff>
--- a/Diurnal and Low Frequency Northward Winds off Chile.pptx
+++ b/Diurnal and Low Frequency Northward Winds off Chile.pptx
@@ -388,7 +388,7 @@
           <a:p>
             <a:fld id="{4215EA97-1EC7-4F85-A8C4-247139B65AC9}" type="datetimeFigureOut">
               <a:rPr lang="en-US" smtClean="0"/>
-              <a:t>8/27/2020</a:t>
+              <a:t>8/31/2020</a:t>
             </a:fld>
             <a:endParaRPr lang="en-US"/>
           </a:p>
@@ -1082,11 +1082,17 @@
           <a:p>
             <a:r>
               <a:rPr lang="en-US" dirty="0"/>
-              <a:t>Separately used the different N* values for each set of CI’s. Now they are much smaller that the standard deviation of the monthly mean from year to year. Will want to check the equation I used to calculate and an seek an explanation of its significance from </a:t>
+              <a:t>Separately used the different N* values for each set of CI’s. Now they are much smaller that the standard deviation of the monthly mean from year to year. Will want to check the equation I used to calculate and an seek an explanation of its significance from 682 notes. </a:t>
+            </a:r>
+          </a:p>
+          <a:p>
+            <a:r>
+              <a:rPr lang="en-US" dirty="0"/>
+              <a:t>The CI’s were calculated using \pm(std)*(alpha/2 upper tail of normalized Gaussian distribution for alpha=0.05)/N* to give us the 95% confidence intervals as noted in the legends above. The narrowness of their range and resultant certainty in the measurement come from the large N*. Although the spread from (not independent events) many vary widely, we are much </a:t>
             </a:r>
             <a:r>
               <a:rPr lang="en-US"/>
-              <a:t>682 notes. </a:t>
+              <a:t>more certain of the mean.  </a:t>
             </a:r>
             <a:endParaRPr lang="en-US" dirty="0"/>
           </a:p>
@@ -1276,7 +1282,7 @@
             <a:fld id="{5586B75A-687E-405C-8A0B-8D00578BA2C3}" type="datetimeFigureOut">
               <a:rPr lang="en-US" smtClean="0"/>
               <a:pPr/>
-              <a:t>8/27/2020</a:t>
+              <a:t>8/31/2020</a:t>
             </a:fld>
             <a:endParaRPr lang="en-US" dirty="0"/>
           </a:p>
@@ -1476,7 +1482,7 @@
             <a:fld id="{5586B75A-687E-405C-8A0B-8D00578BA2C3}" type="datetimeFigureOut">
               <a:rPr lang="en-US" smtClean="0"/>
               <a:pPr/>
-              <a:t>8/27/2020</a:t>
+              <a:t>8/31/2020</a:t>
             </a:fld>
             <a:endParaRPr lang="en-US" dirty="0"/>
           </a:p>
@@ -1686,7 +1692,7 @@
             <a:fld id="{5586B75A-687E-405C-8A0B-8D00578BA2C3}" type="datetimeFigureOut">
               <a:rPr lang="en-US" smtClean="0"/>
               <a:pPr/>
-              <a:t>8/27/2020</a:t>
+              <a:t>8/31/2020</a:t>
             </a:fld>
             <a:endParaRPr lang="en-US" dirty="0"/>
           </a:p>
@@ -1886,7 +1892,7 @@
             <a:fld id="{5586B75A-687E-405C-8A0B-8D00578BA2C3}" type="datetimeFigureOut">
               <a:rPr lang="en-US" smtClean="0"/>
               <a:pPr/>
-              <a:t>8/27/2020</a:t>
+              <a:t>8/31/2020</a:t>
             </a:fld>
             <a:endParaRPr lang="en-US" dirty="0"/>
           </a:p>
@@ -2163,7 +2169,7 @@
             <a:fld id="{5586B75A-687E-405C-8A0B-8D00578BA2C3}" type="datetimeFigureOut">
               <a:rPr lang="en-US" smtClean="0"/>
               <a:pPr/>
-              <a:t>8/27/2020</a:t>
+              <a:t>8/31/2020</a:t>
             </a:fld>
             <a:endParaRPr lang="en-US" dirty="0"/>
           </a:p>
@@ -2430,7 +2436,7 @@
             <a:fld id="{5586B75A-687E-405C-8A0B-8D00578BA2C3}" type="datetimeFigureOut">
               <a:rPr lang="en-US" smtClean="0"/>
               <a:pPr/>
-              <a:t>8/27/2020</a:t>
+              <a:t>8/31/2020</a:t>
             </a:fld>
             <a:endParaRPr lang="en-US" dirty="0"/>
           </a:p>
@@ -2844,7 +2850,7 @@
             <a:fld id="{5586B75A-687E-405C-8A0B-8D00578BA2C3}" type="datetimeFigureOut">
               <a:rPr lang="en-US" smtClean="0"/>
               <a:pPr/>
-              <a:t>8/27/2020</a:t>
+              <a:t>8/31/2020</a:t>
             </a:fld>
             <a:endParaRPr lang="en-US" dirty="0"/>
           </a:p>
@@ -2987,7 +2993,7 @@
             <a:fld id="{5586B75A-687E-405C-8A0B-8D00578BA2C3}" type="datetimeFigureOut">
               <a:rPr lang="en-US" smtClean="0"/>
               <a:pPr/>
-              <a:t>8/27/2020</a:t>
+              <a:t>8/31/2020</a:t>
             </a:fld>
             <a:endParaRPr lang="en-US" dirty="0"/>
           </a:p>
@@ -3102,7 +3108,7 @@
             <a:fld id="{5586B75A-687E-405C-8A0B-8D00578BA2C3}" type="datetimeFigureOut">
               <a:rPr lang="en-US" smtClean="0"/>
               <a:pPr/>
-              <a:t>8/27/2020</a:t>
+              <a:t>8/31/2020</a:t>
             </a:fld>
             <a:endParaRPr lang="en-US" dirty="0"/>
           </a:p>
@@ -3415,7 +3421,7 @@
             <a:fld id="{5586B75A-687E-405C-8A0B-8D00578BA2C3}" type="datetimeFigureOut">
               <a:rPr lang="en-US" smtClean="0"/>
               <a:pPr/>
-              <a:t>8/27/2020</a:t>
+              <a:t>8/31/2020</a:t>
             </a:fld>
             <a:endParaRPr lang="en-US" dirty="0"/>
           </a:p>
@@ -3705,7 +3711,7 @@
             <a:fld id="{5586B75A-687E-405C-8A0B-8D00578BA2C3}" type="datetimeFigureOut">
               <a:rPr lang="en-US" smtClean="0"/>
               <a:pPr/>
-              <a:t>8/27/2020</a:t>
+              <a:t>8/31/2020</a:t>
             </a:fld>
             <a:endParaRPr lang="en-US" dirty="0"/>
           </a:p>
@@ -3954,7 +3960,7 @@
             <a:fld id="{5586B75A-687E-405C-8A0B-8D00578BA2C3}" type="datetimeFigureOut">
               <a:rPr lang="en-US" smtClean="0"/>
               <a:pPr/>
-              <a:t>8/27/2020</a:t>
+              <a:t>8/31/2020</a:t>
             </a:fld>
             <a:endParaRPr lang="en-US" dirty="0"/>
           </a:p>

</xml_diff>

<commit_message>
Filtering and plotting hourly 10-m northward wind velocity with lanczos filter
</commit_message>
<xml_diff>
--- a/Diurnal and Low Frequency Northward Winds off Chile.pptx
+++ b/Diurnal and Low Frequency Northward Winds off Chile.pptx
@@ -5,7 +5,7 @@
     <p:sldMasterId id="2147483852" r:id="rId1"/>
   </p:sldMasterIdLst>
   <p:notesMasterIdLst>
-    <p:notesMasterId r:id="rId18"/>
+    <p:notesMasterId r:id="rId19"/>
   </p:notesMasterIdLst>
   <p:sldIdLst>
     <p:sldId id="256" r:id="rId2"/>
@@ -24,6 +24,7 @@
     <p:sldId id="269" r:id="rId15"/>
     <p:sldId id="270" r:id="rId16"/>
     <p:sldId id="271" r:id="rId17"/>
+    <p:sldId id="272" r:id="rId18"/>
   </p:sldIdLst>
   <p:sldSz cx="12192000" cy="6858000"/>
   <p:notesSz cx="6858000" cy="9144000"/>
@@ -388,7 +389,7 @@
           <a:p>
             <a:fld id="{4215EA97-1EC7-4F85-A8C4-247139B65AC9}" type="datetimeFigureOut">
               <a:rPr lang="en-US" smtClean="0"/>
-              <a:t>8/31/2020</a:t>
+              <a:t>9/9/2020</a:t>
             </a:fld>
             <a:endParaRPr lang="en-US"/>
           </a:p>
@@ -1282,7 +1283,7 @@
             <a:fld id="{5586B75A-687E-405C-8A0B-8D00578BA2C3}" type="datetimeFigureOut">
               <a:rPr lang="en-US" smtClean="0"/>
               <a:pPr/>
-              <a:t>8/31/2020</a:t>
+              <a:t>9/9/2020</a:t>
             </a:fld>
             <a:endParaRPr lang="en-US" dirty="0"/>
           </a:p>
@@ -1482,7 +1483,7 @@
             <a:fld id="{5586B75A-687E-405C-8A0B-8D00578BA2C3}" type="datetimeFigureOut">
               <a:rPr lang="en-US" smtClean="0"/>
               <a:pPr/>
-              <a:t>8/31/2020</a:t>
+              <a:t>9/9/2020</a:t>
             </a:fld>
             <a:endParaRPr lang="en-US" dirty="0"/>
           </a:p>
@@ -1692,7 +1693,7 @@
             <a:fld id="{5586B75A-687E-405C-8A0B-8D00578BA2C3}" type="datetimeFigureOut">
               <a:rPr lang="en-US" smtClean="0"/>
               <a:pPr/>
-              <a:t>8/31/2020</a:t>
+              <a:t>9/9/2020</a:t>
             </a:fld>
             <a:endParaRPr lang="en-US" dirty="0"/>
           </a:p>
@@ -1892,7 +1893,7 @@
             <a:fld id="{5586B75A-687E-405C-8A0B-8D00578BA2C3}" type="datetimeFigureOut">
               <a:rPr lang="en-US" smtClean="0"/>
               <a:pPr/>
-              <a:t>8/31/2020</a:t>
+              <a:t>9/9/2020</a:t>
             </a:fld>
             <a:endParaRPr lang="en-US" dirty="0"/>
           </a:p>
@@ -2169,7 +2170,7 @@
             <a:fld id="{5586B75A-687E-405C-8A0B-8D00578BA2C3}" type="datetimeFigureOut">
               <a:rPr lang="en-US" smtClean="0"/>
               <a:pPr/>
-              <a:t>8/31/2020</a:t>
+              <a:t>9/9/2020</a:t>
             </a:fld>
             <a:endParaRPr lang="en-US" dirty="0"/>
           </a:p>
@@ -2436,7 +2437,7 @@
             <a:fld id="{5586B75A-687E-405C-8A0B-8D00578BA2C3}" type="datetimeFigureOut">
               <a:rPr lang="en-US" smtClean="0"/>
               <a:pPr/>
-              <a:t>8/31/2020</a:t>
+              <a:t>9/9/2020</a:t>
             </a:fld>
             <a:endParaRPr lang="en-US" dirty="0"/>
           </a:p>
@@ -2850,7 +2851,7 @@
             <a:fld id="{5586B75A-687E-405C-8A0B-8D00578BA2C3}" type="datetimeFigureOut">
               <a:rPr lang="en-US" smtClean="0"/>
               <a:pPr/>
-              <a:t>8/31/2020</a:t>
+              <a:t>9/9/2020</a:t>
             </a:fld>
             <a:endParaRPr lang="en-US" dirty="0"/>
           </a:p>
@@ -2993,7 +2994,7 @@
             <a:fld id="{5586B75A-687E-405C-8A0B-8D00578BA2C3}" type="datetimeFigureOut">
               <a:rPr lang="en-US" smtClean="0"/>
               <a:pPr/>
-              <a:t>8/31/2020</a:t>
+              <a:t>9/9/2020</a:t>
             </a:fld>
             <a:endParaRPr lang="en-US" dirty="0"/>
           </a:p>
@@ -3108,7 +3109,7 @@
             <a:fld id="{5586B75A-687E-405C-8A0B-8D00578BA2C3}" type="datetimeFigureOut">
               <a:rPr lang="en-US" smtClean="0"/>
               <a:pPr/>
-              <a:t>8/31/2020</a:t>
+              <a:t>9/9/2020</a:t>
             </a:fld>
             <a:endParaRPr lang="en-US" dirty="0"/>
           </a:p>
@@ -3421,7 +3422,7 @@
             <a:fld id="{5586B75A-687E-405C-8A0B-8D00578BA2C3}" type="datetimeFigureOut">
               <a:rPr lang="en-US" smtClean="0"/>
               <a:pPr/>
-              <a:t>8/31/2020</a:t>
+              <a:t>9/9/2020</a:t>
             </a:fld>
             <a:endParaRPr lang="en-US" dirty="0"/>
           </a:p>
@@ -3711,7 +3712,7 @@
             <a:fld id="{5586B75A-687E-405C-8A0B-8D00578BA2C3}" type="datetimeFigureOut">
               <a:rPr lang="en-US" smtClean="0"/>
               <a:pPr/>
-              <a:t>8/31/2020</a:t>
+              <a:t>9/9/2020</a:t>
             </a:fld>
             <a:endParaRPr lang="en-US" dirty="0"/>
           </a:p>
@@ -3960,7 +3961,7 @@
             <a:fld id="{5586B75A-687E-405C-8A0B-8D00578BA2C3}" type="datetimeFigureOut">
               <a:rPr lang="en-US" smtClean="0"/>
               <a:pPr/>
-              <a:t>8/31/2020</a:t>
+              <a:t>9/9/2020</a:t>
             </a:fld>
             <a:endParaRPr lang="en-US" dirty="0"/>
           </a:p>
@@ -6196,6 +6197,159 @@
 </p:sld>
 </file>
 
+<file path=ppt/slides/slide17.xml><?xml version="1.0" encoding="utf-8"?>
+<p:sld xmlns:a="http://schemas.openxmlformats.org/drawingml/2006/main" xmlns:r="http://schemas.openxmlformats.org/officeDocument/2006/relationships" xmlns:p="http://schemas.openxmlformats.org/presentationml/2006/main">
+  <p:cSld>
+    <p:spTree>
+      <p:nvGrpSpPr>
+        <p:cNvPr id="1" name=""/>
+        <p:cNvGrpSpPr/>
+        <p:nvPr/>
+      </p:nvGrpSpPr>
+      <p:grpSpPr>
+        <a:xfrm>
+          <a:off x="0" y="0"/>
+          <a:ext cx="0" cy="0"/>
+          <a:chOff x="0" y="0"/>
+          <a:chExt cx="0" cy="0"/>
+        </a:xfrm>
+      </p:grpSpPr>
+      <p:sp>
+        <p:nvSpPr>
+          <p:cNvPr id="2" name="Title 1">
+            <a:extLst>
+              <a:ext uri="{FF2B5EF4-FFF2-40B4-BE49-F238E27FC236}">
+                <a16:creationId xmlns:a16="http://schemas.microsoft.com/office/drawing/2014/main" id="{9ED8C07C-A879-4E0E-9BFD-A89C5BA65DD7}"/>
+              </a:ext>
+            </a:extLst>
+          </p:cNvPr>
+          <p:cNvSpPr>
+            <a:spLocks noGrp="1"/>
+          </p:cNvSpPr>
+          <p:nvPr>
+            <p:ph type="title"/>
+          </p:nvPr>
+        </p:nvSpPr>
+        <p:spPr/>
+        <p:txBody>
+          <a:bodyPr/>
+          <a:lstStyle/>
+          <a:p>
+            <a:r>
+              <a:rPr lang="en-US" dirty="0"/>
+              <a:t>Using a </a:t>
+            </a:r>
+            <a:r>
+              <a:rPr lang="en-US" dirty="0" err="1"/>
+              <a:t>Lanczos</a:t>
+            </a:r>
+            <a:r>
+              <a:rPr lang="en-US" dirty="0"/>
+              <a:t> filter </a:t>
+            </a:r>
+          </a:p>
+        </p:txBody>
+      </p:sp>
+      <p:pic>
+        <p:nvPicPr>
+          <p:cNvPr id="5" name="Content Placeholder 4">
+            <a:extLst>
+              <a:ext uri="{FF2B5EF4-FFF2-40B4-BE49-F238E27FC236}">
+                <a16:creationId xmlns:a16="http://schemas.microsoft.com/office/drawing/2014/main" id="{51CA53CE-B072-4410-8491-1A3EE0B45522}"/>
+              </a:ext>
+            </a:extLst>
+          </p:cNvPr>
+          <p:cNvPicPr>
+            <a:picLocks noGrp="1" noChangeAspect="1"/>
+          </p:cNvPicPr>
+          <p:nvPr>
+            <p:ph idx="1"/>
+          </p:nvPr>
+        </p:nvPicPr>
+        <p:blipFill rotWithShape="1">
+          <a:blip r:embed="rId2"/>
+          <a:srcRect l="9107" r="9018"/>
+          <a:stretch/>
+        </p:blipFill>
+        <p:spPr>
+          <a:xfrm>
+            <a:off x="443802" y="1909187"/>
+            <a:ext cx="11304396" cy="2843241"/>
+          </a:xfrm>
+        </p:spPr>
+      </p:pic>
+      <p:sp>
+        <p:nvSpPr>
+          <p:cNvPr id="6" name="TextBox 5">
+            <a:extLst>
+              <a:ext uri="{FF2B5EF4-FFF2-40B4-BE49-F238E27FC236}">
+                <a16:creationId xmlns:a16="http://schemas.microsoft.com/office/drawing/2014/main" id="{06C36955-2371-44A9-966B-01A61D669144}"/>
+              </a:ext>
+            </a:extLst>
+          </p:cNvPr>
+          <p:cNvSpPr txBox="1"/>
+          <p:nvPr/>
+        </p:nvSpPr>
+        <p:spPr>
+          <a:xfrm>
+            <a:off x="838200" y="5205046"/>
+            <a:ext cx="10647066" cy="923330"/>
+          </a:xfrm>
+          <a:prstGeom prst="rect">
+            <a:avLst/>
+          </a:prstGeom>
+          <a:noFill/>
+        </p:spPr>
+        <p:txBody>
+          <a:bodyPr wrap="square" rtlCol="0">
+            <a:spAutoFit/>
+          </a:bodyPr>
+          <a:lstStyle/>
+          <a:p>
+            <a:pPr marL="285750" indent="-285750">
+              <a:buFont typeface="Arial" panose="020B0604020202020204" pitchFamily="34" charset="0"/>
+              <a:buChar char="•"/>
+            </a:pPr>
+            <a:r>
+              <a:rPr lang="en-US" dirty="0"/>
+              <a:t>Same 10-year dataset of 10-m northward component of wind velocity</a:t>
+            </a:r>
+          </a:p>
+          <a:p>
+            <a:pPr marL="285750" indent="-285750">
+              <a:buFont typeface="Arial" panose="020B0604020202020204" pitchFamily="34" charset="0"/>
+              <a:buChar char="•"/>
+            </a:pPr>
+            <a:r>
+              <a:rPr lang="en-US" dirty="0"/>
+              <a:t>Cutoff frequency of 1/33 hour**-1</a:t>
+            </a:r>
+          </a:p>
+          <a:p>
+            <a:pPr marL="285750" indent="-285750">
+              <a:buFont typeface="Arial" panose="020B0604020202020204" pitchFamily="34" charset="0"/>
+              <a:buChar char="•"/>
+            </a:pPr>
+            <a:r>
+              <a:rPr lang="en-US" dirty="0"/>
+              <a:t>121 sample window length</a:t>
+            </a:r>
+          </a:p>
+        </p:txBody>
+      </p:sp>
+    </p:spTree>
+    <p:extLst>
+      <p:ext uri="{BB962C8B-B14F-4D97-AF65-F5344CB8AC3E}">
+        <p14:creationId xmlns:p14="http://schemas.microsoft.com/office/powerpoint/2010/main" val="2122560822"/>
+      </p:ext>
+    </p:extLst>
+  </p:cSld>
+  <p:clrMapOvr>
+    <a:masterClrMapping/>
+  </p:clrMapOvr>
+</p:sld>
+</file>
+
 <file path=ppt/slides/slide2.xml><?xml version="1.0" encoding="utf-8"?>
 <p:sld xmlns:a="http://schemas.openxmlformats.org/drawingml/2006/main" xmlns:r="http://schemas.openxmlformats.org/officeDocument/2006/relationships" xmlns:p="http://schemas.openxmlformats.org/presentationml/2006/main" show="0">
   <p:cSld>

</xml_diff>

<commit_message>
Adding content for 9/10 meeting
</commit_message>
<xml_diff>
--- a/Diurnal and Low Frequency Northward Winds off Chile.pptx
+++ b/Diurnal and Low Frequency Northward Winds off Chile.pptx
@@ -5,7 +5,7 @@
     <p:sldMasterId id="2147483852" r:id="rId1"/>
   </p:sldMasterIdLst>
   <p:notesMasterIdLst>
-    <p:notesMasterId r:id="rId19"/>
+    <p:notesMasterId r:id="rId20"/>
   </p:notesMasterIdLst>
   <p:sldIdLst>
     <p:sldId id="256" r:id="rId2"/>
@@ -21,10 +21,11 @@
     <p:sldId id="264" r:id="rId12"/>
     <p:sldId id="262" r:id="rId13"/>
     <p:sldId id="268" r:id="rId14"/>
-    <p:sldId id="269" r:id="rId15"/>
-    <p:sldId id="270" r:id="rId16"/>
-    <p:sldId id="271" r:id="rId17"/>
-    <p:sldId id="272" r:id="rId18"/>
+    <p:sldId id="273" r:id="rId15"/>
+    <p:sldId id="269" r:id="rId16"/>
+    <p:sldId id="270" r:id="rId17"/>
+    <p:sldId id="271" r:id="rId18"/>
+    <p:sldId id="272" r:id="rId19"/>
   </p:sldIdLst>
   <p:sldSz cx="12192000" cy="6858000"/>
   <p:notesSz cx="6858000" cy="9144000"/>
@@ -389,7 +390,7 @@
           <a:p>
             <a:fld id="{4215EA97-1EC7-4F85-A8C4-247139B65AC9}" type="datetimeFigureOut">
               <a:rPr lang="en-US" smtClean="0"/>
-              <a:t>9/9/2020</a:t>
+              <a:t>9/10/2020</a:t>
             </a:fld>
             <a:endParaRPr lang="en-US"/>
           </a:p>
@@ -904,7 +905,7 @@
           <a:p>
             <a:r>
               <a:rPr lang="en-US" dirty="0"/>
-              <a:t>This N* is useful for confidence intervals of independent synoptic-band events</a:t>
+              <a:t>Did not get to the monthly averaged product from era5 this week</a:t>
             </a:r>
           </a:p>
         </p:txBody>
@@ -935,7 +936,7 @@
     </p:spTree>
     <p:extLst>
       <p:ext uri="{BB962C8B-B14F-4D97-AF65-F5344CB8AC3E}">
-        <p14:creationId xmlns:p14="http://schemas.microsoft.com/office/powerpoint/2010/main" val="4221826256"/>
+        <p14:creationId xmlns:p14="http://schemas.microsoft.com/office/powerpoint/2010/main" val="2752187847"/>
       </p:ext>
     </p:extLst>
   </p:cSld>
@@ -991,13 +992,8 @@
           <a:p>
             <a:r>
               <a:rPr lang="en-US" dirty="0"/>
-              <a:t>N* for independent events on diurnal </a:t>
-            </a:r>
-            <a:r>
-              <a:rPr lang="en-US"/>
-              <a:t>time scales.</a:t>
-            </a:r>
-            <a:endParaRPr lang="en-US" dirty="0"/>
+              <a:t>This N* is useful for confidence intervals of independent synoptic-band events</a:t>
+            </a:r>
           </a:p>
         </p:txBody>
       </p:sp>
@@ -1027,7 +1023,7 @@
     </p:spTree>
     <p:extLst>
       <p:ext uri="{BB962C8B-B14F-4D97-AF65-F5344CB8AC3E}">
-        <p14:creationId xmlns:p14="http://schemas.microsoft.com/office/powerpoint/2010/main" val="610623422"/>
+        <p14:creationId xmlns:p14="http://schemas.microsoft.com/office/powerpoint/2010/main" val="4221826256"/>
       </p:ext>
     </p:extLst>
   </p:cSld>
@@ -1083,17 +1079,11 @@
           <a:p>
             <a:r>
               <a:rPr lang="en-US" dirty="0"/>
-              <a:t>Separately used the different N* values for each set of CI’s. Now they are much smaller that the standard deviation of the monthly mean from year to year. Will want to check the equation I used to calculate and an seek an explanation of its significance from 682 notes. </a:t>
-            </a:r>
-          </a:p>
-          <a:p>
-            <a:r>
-              <a:rPr lang="en-US" dirty="0"/>
-              <a:t>The CI’s were calculated using \pm(std)*(alpha/2 upper tail of normalized Gaussian distribution for alpha=0.05)/N* to give us the 95% confidence intervals as noted in the legends above. The narrowness of their range and resultant certainty in the measurement come from the large N*. Although the spread from (not independent events) many vary widely, we are much </a:t>
+              <a:t>N* for independent events on diurnal </a:t>
             </a:r>
             <a:r>
               <a:rPr lang="en-US"/>
-              <a:t>more certain of the mean.  </a:t>
+              <a:t>time scales.</a:t>
             </a:r>
             <a:endParaRPr lang="en-US" dirty="0"/>
           </a:p>
@@ -1117,6 +1107,99 @@
             <a:fld id="{28DA9E86-D76E-4569-9EA2-B7BB8F3430A8}" type="slidenum">
               <a:rPr lang="en-US" smtClean="0"/>
               <a:t>16</a:t>
+            </a:fld>
+            <a:endParaRPr lang="en-US"/>
+          </a:p>
+        </p:txBody>
+      </p:sp>
+    </p:spTree>
+    <p:extLst>
+      <p:ext uri="{BB962C8B-B14F-4D97-AF65-F5344CB8AC3E}">
+        <p14:creationId xmlns:p14="http://schemas.microsoft.com/office/powerpoint/2010/main" val="610623422"/>
+      </p:ext>
+    </p:extLst>
+  </p:cSld>
+  <p:clrMapOvr>
+    <a:masterClrMapping/>
+  </p:clrMapOvr>
+</p:notes>
+</file>
+
+<file path=ppt/notesSlides/notesSlide6.xml><?xml version="1.0" encoding="utf-8"?>
+<p:notes xmlns:a="http://schemas.openxmlformats.org/drawingml/2006/main" xmlns:r="http://schemas.openxmlformats.org/officeDocument/2006/relationships" xmlns:p="http://schemas.openxmlformats.org/presentationml/2006/main">
+  <p:cSld>
+    <p:spTree>
+      <p:nvGrpSpPr>
+        <p:cNvPr id="1" name=""/>
+        <p:cNvGrpSpPr/>
+        <p:nvPr/>
+      </p:nvGrpSpPr>
+      <p:grpSpPr>
+        <a:xfrm>
+          <a:off x="0" y="0"/>
+          <a:ext cx="0" cy="0"/>
+          <a:chOff x="0" y="0"/>
+          <a:chExt cx="0" cy="0"/>
+        </a:xfrm>
+      </p:grpSpPr>
+      <p:sp>
+        <p:nvSpPr>
+          <p:cNvPr id="2" name="Slide Image Placeholder 1"/>
+          <p:cNvSpPr>
+            <a:spLocks noGrp="1" noRot="1" noChangeAspect="1"/>
+          </p:cNvSpPr>
+          <p:nvPr>
+            <p:ph type="sldImg"/>
+          </p:nvPr>
+        </p:nvSpPr>
+        <p:spPr/>
+      </p:sp>
+      <p:sp>
+        <p:nvSpPr>
+          <p:cNvPr id="3" name="Notes Placeholder 2"/>
+          <p:cNvSpPr>
+            <a:spLocks noGrp="1"/>
+          </p:cNvSpPr>
+          <p:nvPr>
+            <p:ph type="body" idx="1"/>
+          </p:nvPr>
+        </p:nvSpPr>
+        <p:spPr/>
+        <p:txBody>
+          <a:bodyPr/>
+          <a:lstStyle/>
+          <a:p>
+            <a:r>
+              <a:rPr lang="en-US" dirty="0"/>
+              <a:t>Separately used the different N* values for each set of CI’s. Now they are much smaller that the standard deviation of the monthly mean from year to year. Will want to check the equation I used to calculate and an seek an explanation of its significance from 682 notes. </a:t>
+            </a:r>
+          </a:p>
+          <a:p>
+            <a:r>
+              <a:rPr lang="en-US" dirty="0"/>
+              <a:t>The CI’s were calculated using \pm(std)*(alpha/2 upper tail of normalized Gaussian distribution for alpha=0.05)/N* to give us the 95% confidence intervals as noted in the legends above. The narrowness of their range and resultant certainty in the measurement come from the large N*. Although the spread from (not independent events) many vary widely, we are much more certain of the mean.  </a:t>
+            </a:r>
+          </a:p>
+        </p:txBody>
+      </p:sp>
+      <p:sp>
+        <p:nvSpPr>
+          <p:cNvPr id="4" name="Slide Number Placeholder 3"/>
+          <p:cNvSpPr>
+            <a:spLocks noGrp="1"/>
+          </p:cNvSpPr>
+          <p:nvPr>
+            <p:ph type="sldNum" sz="quarter" idx="5"/>
+          </p:nvPr>
+        </p:nvSpPr>
+        <p:spPr/>
+        <p:txBody>
+          <a:bodyPr/>
+          <a:lstStyle/>
+          <a:p>
+            <a:fld id="{28DA9E86-D76E-4569-9EA2-B7BB8F3430A8}" type="slidenum">
+              <a:rPr lang="en-US" smtClean="0"/>
+              <a:t>17</a:t>
             </a:fld>
             <a:endParaRPr lang="en-US"/>
           </a:p>
@@ -1283,7 +1366,7 @@
             <a:fld id="{5586B75A-687E-405C-8A0B-8D00578BA2C3}" type="datetimeFigureOut">
               <a:rPr lang="en-US" smtClean="0"/>
               <a:pPr/>
-              <a:t>9/9/2020</a:t>
+              <a:t>9/10/2020</a:t>
             </a:fld>
             <a:endParaRPr lang="en-US" dirty="0"/>
           </a:p>
@@ -1483,7 +1566,7 @@
             <a:fld id="{5586B75A-687E-405C-8A0B-8D00578BA2C3}" type="datetimeFigureOut">
               <a:rPr lang="en-US" smtClean="0"/>
               <a:pPr/>
-              <a:t>9/9/2020</a:t>
+              <a:t>9/10/2020</a:t>
             </a:fld>
             <a:endParaRPr lang="en-US" dirty="0"/>
           </a:p>
@@ -1693,7 +1776,7 @@
             <a:fld id="{5586B75A-687E-405C-8A0B-8D00578BA2C3}" type="datetimeFigureOut">
               <a:rPr lang="en-US" smtClean="0"/>
               <a:pPr/>
-              <a:t>9/9/2020</a:t>
+              <a:t>9/10/2020</a:t>
             </a:fld>
             <a:endParaRPr lang="en-US" dirty="0"/>
           </a:p>
@@ -1893,7 +1976,7 @@
             <a:fld id="{5586B75A-687E-405C-8A0B-8D00578BA2C3}" type="datetimeFigureOut">
               <a:rPr lang="en-US" smtClean="0"/>
               <a:pPr/>
-              <a:t>9/9/2020</a:t>
+              <a:t>9/10/2020</a:t>
             </a:fld>
             <a:endParaRPr lang="en-US" dirty="0"/>
           </a:p>
@@ -2170,7 +2253,7 @@
             <a:fld id="{5586B75A-687E-405C-8A0B-8D00578BA2C3}" type="datetimeFigureOut">
               <a:rPr lang="en-US" smtClean="0"/>
               <a:pPr/>
-              <a:t>9/9/2020</a:t>
+              <a:t>9/10/2020</a:t>
             </a:fld>
             <a:endParaRPr lang="en-US" dirty="0"/>
           </a:p>
@@ -2437,7 +2520,7 @@
             <a:fld id="{5586B75A-687E-405C-8A0B-8D00578BA2C3}" type="datetimeFigureOut">
               <a:rPr lang="en-US" smtClean="0"/>
               <a:pPr/>
-              <a:t>9/9/2020</a:t>
+              <a:t>9/10/2020</a:t>
             </a:fld>
             <a:endParaRPr lang="en-US" dirty="0"/>
           </a:p>
@@ -2851,7 +2934,7 @@
             <a:fld id="{5586B75A-687E-405C-8A0B-8D00578BA2C3}" type="datetimeFigureOut">
               <a:rPr lang="en-US" smtClean="0"/>
               <a:pPr/>
-              <a:t>9/9/2020</a:t>
+              <a:t>9/10/2020</a:t>
             </a:fld>
             <a:endParaRPr lang="en-US" dirty="0"/>
           </a:p>
@@ -2994,7 +3077,7 @@
             <a:fld id="{5586B75A-687E-405C-8A0B-8D00578BA2C3}" type="datetimeFigureOut">
               <a:rPr lang="en-US" smtClean="0"/>
               <a:pPr/>
-              <a:t>9/9/2020</a:t>
+              <a:t>9/10/2020</a:t>
             </a:fld>
             <a:endParaRPr lang="en-US" dirty="0"/>
           </a:p>
@@ -3109,7 +3192,7 @@
             <a:fld id="{5586B75A-687E-405C-8A0B-8D00578BA2C3}" type="datetimeFigureOut">
               <a:rPr lang="en-US" smtClean="0"/>
               <a:pPr/>
-              <a:t>9/9/2020</a:t>
+              <a:t>9/10/2020</a:t>
             </a:fld>
             <a:endParaRPr lang="en-US" dirty="0"/>
           </a:p>
@@ -3422,7 +3505,7 @@
             <a:fld id="{5586B75A-687E-405C-8A0B-8D00578BA2C3}" type="datetimeFigureOut">
               <a:rPr lang="en-US" smtClean="0"/>
               <a:pPr/>
-              <a:t>9/9/2020</a:t>
+              <a:t>9/10/2020</a:t>
             </a:fld>
             <a:endParaRPr lang="en-US" dirty="0"/>
           </a:p>
@@ -3712,7 +3795,7 @@
             <a:fld id="{5586B75A-687E-405C-8A0B-8D00578BA2C3}" type="datetimeFigureOut">
               <a:rPr lang="en-US" smtClean="0"/>
               <a:pPr/>
-              <a:t>9/9/2020</a:t>
+              <a:t>9/10/2020</a:t>
             </a:fld>
             <a:endParaRPr lang="en-US" dirty="0"/>
           </a:p>
@@ -3961,7 +4044,7 @@
             <a:fld id="{5586B75A-687E-405C-8A0B-8D00578BA2C3}" type="datetimeFigureOut">
               <a:rPr lang="en-US" smtClean="0"/>
               <a:pPr/>
-              <a:t>9/9/2020</a:t>
+              <a:t>9/10/2020</a:t>
             </a:fld>
             <a:endParaRPr lang="en-US" dirty="0"/>
           </a:p>
@@ -5844,6 +5927,182 @@
           <p:cNvPr id="2" name="Title 1">
             <a:extLst>
               <a:ext uri="{FF2B5EF4-FFF2-40B4-BE49-F238E27FC236}">
+                <a16:creationId xmlns:a16="http://schemas.microsoft.com/office/drawing/2014/main" id="{241E9EFA-89F5-46A9-AB65-9FEE197112CA}"/>
+              </a:ext>
+            </a:extLst>
+          </p:cNvPr>
+          <p:cNvSpPr>
+            <a:spLocks noGrp="1"/>
+          </p:cNvSpPr>
+          <p:nvPr>
+            <p:ph type="title"/>
+          </p:nvPr>
+        </p:nvSpPr>
+        <p:spPr/>
+        <p:txBody>
+          <a:bodyPr/>
+          <a:lstStyle/>
+          <a:p>
+            <a:r>
+              <a:rPr lang="en-US" dirty="0"/>
+              <a:t>Tasks from last meeting</a:t>
+            </a:r>
+          </a:p>
+        </p:txBody>
+      </p:sp>
+      <p:sp>
+        <p:nvSpPr>
+          <p:cNvPr id="3" name="Content Placeholder 2">
+            <a:extLst>
+              <a:ext uri="{FF2B5EF4-FFF2-40B4-BE49-F238E27FC236}">
+                <a16:creationId xmlns:a16="http://schemas.microsoft.com/office/drawing/2014/main" id="{25A89775-7862-4D91-96C1-CF7A936DFC48}"/>
+              </a:ext>
+            </a:extLst>
+          </p:cNvPr>
+          <p:cNvSpPr>
+            <a:spLocks noGrp="1"/>
+          </p:cNvSpPr>
+          <p:nvPr>
+            <p:ph idx="1"/>
+          </p:nvPr>
+        </p:nvSpPr>
+        <p:spPr/>
+        <p:txBody>
+          <a:bodyPr>
+            <a:normAutofit lnSpcReduction="10000"/>
+          </a:bodyPr>
+          <a:lstStyle/>
+          <a:p>
+            <a:r>
+              <a:rPr lang="en-US" dirty="0"/>
+              <a:t>Seek help for pl66 filter with </a:t>
+            </a:r>
+            <a:r>
+              <a:rPr lang="en-US" dirty="0" err="1"/>
+              <a:t>xarray</a:t>
+            </a:r>
+            <a:endParaRPr lang="en-US" dirty="0"/>
+          </a:p>
+          <a:p>
+            <a:r>
+              <a:rPr lang="en-US" dirty="0"/>
+              <a:t>Add notes about what N* means in each case</a:t>
+            </a:r>
+          </a:p>
+          <a:p>
+            <a:r>
+              <a:rPr lang="en-US" dirty="0"/>
+              <a:t>New confidence intervals with N*’s</a:t>
+            </a:r>
+          </a:p>
+          <a:p>
+            <a:r>
+              <a:rPr lang="en-US" dirty="0"/>
+              <a:t>Read about OISST</a:t>
+            </a:r>
+          </a:p>
+          <a:p>
+            <a:r>
+              <a:rPr lang="en-US" dirty="0"/>
+              <a:t>Read </a:t>
+            </a:r>
+            <a:r>
+              <a:rPr lang="en-US" dirty="0" err="1"/>
+              <a:t>Gentemann</a:t>
+            </a:r>
+            <a:r>
+              <a:rPr lang="en-US" dirty="0"/>
+              <a:t>, et al. (2016)</a:t>
+            </a:r>
+          </a:p>
+          <a:p>
+            <a:r>
+              <a:rPr lang="en-US" dirty="0">
+                <a:solidFill>
+                  <a:schemeClr val="bg2">
+                    <a:lumMod val="50000"/>
+                  </a:schemeClr>
+                </a:solidFill>
+              </a:rPr>
+              <a:t>Look at seasonal vectors of the “monthly averaged” product from ERA-5</a:t>
+            </a:r>
+          </a:p>
+          <a:p>
+            <a:pPr lvl="1"/>
+            <a:r>
+              <a:rPr lang="en-US" dirty="0">
+                <a:solidFill>
+                  <a:schemeClr val="bg2">
+                    <a:lumMod val="50000"/>
+                  </a:schemeClr>
+                </a:solidFill>
+              </a:rPr>
+              <a:t>Maps of each month</a:t>
+            </a:r>
+          </a:p>
+          <a:p>
+            <a:pPr lvl="1"/>
+            <a:r>
+              <a:rPr lang="en-US" dirty="0">
+                <a:solidFill>
+                  <a:schemeClr val="bg2">
+                    <a:lumMod val="50000"/>
+                  </a:schemeClr>
+                </a:solidFill>
+              </a:rPr>
+              <a:t>Time series of upwelling centers</a:t>
+            </a:r>
+          </a:p>
+          <a:p>
+            <a:pPr lvl="1"/>
+            <a:r>
+              <a:rPr lang="en-US" dirty="0">
+                <a:solidFill>
+                  <a:schemeClr val="bg2">
+                    <a:lumMod val="50000"/>
+                  </a:schemeClr>
+                </a:solidFill>
+              </a:rPr>
+              <a:t>w/ scaled wind vectors</a:t>
+            </a:r>
+          </a:p>
+        </p:txBody>
+      </p:sp>
+    </p:spTree>
+    <p:extLst>
+      <p:ext uri="{BB962C8B-B14F-4D97-AF65-F5344CB8AC3E}">
+        <p14:creationId xmlns:p14="http://schemas.microsoft.com/office/powerpoint/2010/main" val="2122606727"/>
+      </p:ext>
+    </p:extLst>
+  </p:cSld>
+  <p:clrMapOvr>
+    <a:masterClrMapping/>
+  </p:clrMapOvr>
+</p:sld>
+</file>
+
+<file path=ppt/slides/slide15.xml><?xml version="1.0" encoding="utf-8"?>
+<p:sld xmlns:a="http://schemas.openxmlformats.org/drawingml/2006/main" xmlns:r="http://schemas.openxmlformats.org/officeDocument/2006/relationships" xmlns:p="http://schemas.openxmlformats.org/presentationml/2006/main">
+  <p:cSld>
+    <p:spTree>
+      <p:nvGrpSpPr>
+        <p:cNvPr id="1" name=""/>
+        <p:cNvGrpSpPr/>
+        <p:nvPr/>
+      </p:nvGrpSpPr>
+      <p:grpSpPr>
+        <a:xfrm>
+          <a:off x="0" y="0"/>
+          <a:ext cx="0" cy="0"/>
+          <a:chOff x="0" y="0"/>
+          <a:chExt cx="0" cy="0"/>
+        </a:xfrm>
+      </p:grpSpPr>
+      <p:sp>
+        <p:nvSpPr>
+          <p:cNvPr id="2" name="Title 1">
+            <a:extLst>
+              <a:ext uri="{FF2B5EF4-FFF2-40B4-BE49-F238E27FC236}">
                 <a16:creationId xmlns:a16="http://schemas.microsoft.com/office/drawing/2014/main" id="{233CA4CD-A43C-446C-81DF-75A11F1CBE40}"/>
               </a:ext>
             </a:extLst>
@@ -6001,7 +6260,7 @@
 </p:sld>
 </file>
 
-<file path=ppt/slides/slide15.xml><?xml version="1.0" encoding="utf-8"?>
+<file path=ppt/slides/slide16.xml><?xml version="1.0" encoding="utf-8"?>
 <p:sld xmlns:a="http://schemas.openxmlformats.org/drawingml/2006/main" xmlns:r="http://schemas.openxmlformats.org/officeDocument/2006/relationships" xmlns:p="http://schemas.openxmlformats.org/presentationml/2006/main">
   <p:cSld>
     <p:spTree>
@@ -6103,7 +6362,7 @@
 </p:sld>
 </file>
 
-<file path=ppt/slides/slide16.xml><?xml version="1.0" encoding="utf-8"?>
+<file path=ppt/slides/slide17.xml><?xml version="1.0" encoding="utf-8"?>
 <p:sld xmlns:a="http://schemas.openxmlformats.org/drawingml/2006/main" xmlns:r="http://schemas.openxmlformats.org/officeDocument/2006/relationships" xmlns:p="http://schemas.openxmlformats.org/presentationml/2006/main">
   <p:cSld>
     <p:spTree>
@@ -6184,6 +6443,41 @@
           </a:xfrm>
         </p:spPr>
       </p:pic>
+      <p:sp>
+        <p:nvSpPr>
+          <p:cNvPr id="3" name="TextBox 2">
+            <a:extLst>
+              <a:ext uri="{FF2B5EF4-FFF2-40B4-BE49-F238E27FC236}">
+                <a16:creationId xmlns:a16="http://schemas.microsoft.com/office/drawing/2014/main" id="{61987E6B-9C69-412C-A1C0-361F2A62BC85}"/>
+              </a:ext>
+            </a:extLst>
+          </p:cNvPr>
+          <p:cNvSpPr txBox="1"/>
+          <p:nvPr/>
+        </p:nvSpPr>
+        <p:spPr>
+          <a:xfrm>
+            <a:off x="6018963" y="826531"/>
+            <a:ext cx="391885" cy="369332"/>
+          </a:xfrm>
+          <a:prstGeom prst="rect">
+            <a:avLst/>
+          </a:prstGeom>
+          <a:noFill/>
+        </p:spPr>
+        <p:txBody>
+          <a:bodyPr wrap="square" rtlCol="0">
+            <a:spAutoFit/>
+          </a:bodyPr>
+          <a:lstStyle/>
+          <a:p>
+            <a:r>
+              <a:rPr lang="en-US" dirty="0"/>
+              <a:t>of</a:t>
+            </a:r>
+          </a:p>
+        </p:txBody>
+      </p:sp>
     </p:spTree>
     <p:extLst>
       <p:ext uri="{BB962C8B-B14F-4D97-AF65-F5344CB8AC3E}">
@@ -6197,7 +6491,7 @@
 </p:sld>
 </file>
 
-<file path=ppt/slides/slide17.xml><?xml version="1.0" encoding="utf-8"?>
+<file path=ppt/slides/slide18.xml><?xml version="1.0" encoding="utf-8"?>
 <p:sld xmlns:a="http://schemas.openxmlformats.org/drawingml/2006/main" xmlns:r="http://schemas.openxmlformats.org/officeDocument/2006/relationships" xmlns:p="http://schemas.openxmlformats.org/presentationml/2006/main">
   <p:cSld>
     <p:spTree>

</xml_diff>

<commit_message>
Comparing Lanczos filter to pl66 filter
</commit_message>
<xml_diff>
--- a/Diurnal and Low Frequency Northward Winds off Chile.pptx
+++ b/Diurnal and Low Frequency Northward Winds off Chile.pptx
@@ -5,7 +5,7 @@
     <p:sldMasterId id="2147483852" r:id="rId1"/>
   </p:sldMasterIdLst>
   <p:notesMasterIdLst>
-    <p:notesMasterId r:id="rId20"/>
+    <p:notesMasterId r:id="rId21"/>
   </p:notesMasterIdLst>
   <p:sldIdLst>
     <p:sldId id="256" r:id="rId2"/>
@@ -26,6 +26,7 @@
     <p:sldId id="270" r:id="rId17"/>
     <p:sldId id="271" r:id="rId18"/>
     <p:sldId id="272" r:id="rId19"/>
+    <p:sldId id="274" r:id="rId20"/>
   </p:sldIdLst>
   <p:sldSz cx="12192000" cy="6858000"/>
   <p:notesSz cx="6858000" cy="9144000"/>
@@ -390,7 +391,7 @@
           <a:p>
             <a:fld id="{4215EA97-1EC7-4F85-A8C4-247139B65AC9}" type="datetimeFigureOut">
               <a:rPr lang="en-US" smtClean="0"/>
-              <a:t>9/10/2020</a:t>
+              <a:t>9/11/2020</a:t>
             </a:fld>
             <a:endParaRPr lang="en-US"/>
           </a:p>
@@ -1366,7 +1367,7 @@
             <a:fld id="{5586B75A-687E-405C-8A0B-8D00578BA2C3}" type="datetimeFigureOut">
               <a:rPr lang="en-US" smtClean="0"/>
               <a:pPr/>
-              <a:t>9/10/2020</a:t>
+              <a:t>9/11/2020</a:t>
             </a:fld>
             <a:endParaRPr lang="en-US" dirty="0"/>
           </a:p>
@@ -1566,7 +1567,7 @@
             <a:fld id="{5586B75A-687E-405C-8A0B-8D00578BA2C3}" type="datetimeFigureOut">
               <a:rPr lang="en-US" smtClean="0"/>
               <a:pPr/>
-              <a:t>9/10/2020</a:t>
+              <a:t>9/11/2020</a:t>
             </a:fld>
             <a:endParaRPr lang="en-US" dirty="0"/>
           </a:p>
@@ -1776,7 +1777,7 @@
             <a:fld id="{5586B75A-687E-405C-8A0B-8D00578BA2C3}" type="datetimeFigureOut">
               <a:rPr lang="en-US" smtClean="0"/>
               <a:pPr/>
-              <a:t>9/10/2020</a:t>
+              <a:t>9/11/2020</a:t>
             </a:fld>
             <a:endParaRPr lang="en-US" dirty="0"/>
           </a:p>
@@ -1976,7 +1977,7 @@
             <a:fld id="{5586B75A-687E-405C-8A0B-8D00578BA2C3}" type="datetimeFigureOut">
               <a:rPr lang="en-US" smtClean="0"/>
               <a:pPr/>
-              <a:t>9/10/2020</a:t>
+              <a:t>9/11/2020</a:t>
             </a:fld>
             <a:endParaRPr lang="en-US" dirty="0"/>
           </a:p>
@@ -2253,7 +2254,7 @@
             <a:fld id="{5586B75A-687E-405C-8A0B-8D00578BA2C3}" type="datetimeFigureOut">
               <a:rPr lang="en-US" smtClean="0"/>
               <a:pPr/>
-              <a:t>9/10/2020</a:t>
+              <a:t>9/11/2020</a:t>
             </a:fld>
             <a:endParaRPr lang="en-US" dirty="0"/>
           </a:p>
@@ -2520,7 +2521,7 @@
             <a:fld id="{5586B75A-687E-405C-8A0B-8D00578BA2C3}" type="datetimeFigureOut">
               <a:rPr lang="en-US" smtClean="0"/>
               <a:pPr/>
-              <a:t>9/10/2020</a:t>
+              <a:t>9/11/2020</a:t>
             </a:fld>
             <a:endParaRPr lang="en-US" dirty="0"/>
           </a:p>
@@ -2934,7 +2935,7 @@
             <a:fld id="{5586B75A-687E-405C-8A0B-8D00578BA2C3}" type="datetimeFigureOut">
               <a:rPr lang="en-US" smtClean="0"/>
               <a:pPr/>
-              <a:t>9/10/2020</a:t>
+              <a:t>9/11/2020</a:t>
             </a:fld>
             <a:endParaRPr lang="en-US" dirty="0"/>
           </a:p>
@@ -3077,7 +3078,7 @@
             <a:fld id="{5586B75A-687E-405C-8A0B-8D00578BA2C3}" type="datetimeFigureOut">
               <a:rPr lang="en-US" smtClean="0"/>
               <a:pPr/>
-              <a:t>9/10/2020</a:t>
+              <a:t>9/11/2020</a:t>
             </a:fld>
             <a:endParaRPr lang="en-US" dirty="0"/>
           </a:p>
@@ -3192,7 +3193,7 @@
             <a:fld id="{5586B75A-687E-405C-8A0B-8D00578BA2C3}" type="datetimeFigureOut">
               <a:rPr lang="en-US" smtClean="0"/>
               <a:pPr/>
-              <a:t>9/10/2020</a:t>
+              <a:t>9/11/2020</a:t>
             </a:fld>
             <a:endParaRPr lang="en-US" dirty="0"/>
           </a:p>
@@ -3505,7 +3506,7 @@
             <a:fld id="{5586B75A-687E-405C-8A0B-8D00578BA2C3}" type="datetimeFigureOut">
               <a:rPr lang="en-US" smtClean="0"/>
               <a:pPr/>
-              <a:t>9/10/2020</a:t>
+              <a:t>9/11/2020</a:t>
             </a:fld>
             <a:endParaRPr lang="en-US" dirty="0"/>
           </a:p>
@@ -3795,7 +3796,7 @@
             <a:fld id="{5586B75A-687E-405C-8A0B-8D00578BA2C3}" type="datetimeFigureOut">
               <a:rPr lang="en-US" smtClean="0"/>
               <a:pPr/>
-              <a:t>9/10/2020</a:t>
+              <a:t>9/11/2020</a:t>
             </a:fld>
             <a:endParaRPr lang="en-US" dirty="0"/>
           </a:p>
@@ -4044,7 +4045,7 @@
             <a:fld id="{5586B75A-687E-405C-8A0B-8D00578BA2C3}" type="datetimeFigureOut">
               <a:rPr lang="en-US" smtClean="0"/>
               <a:pPr/>
-              <a:t>9/10/2020</a:t>
+              <a:t>9/11/2020</a:t>
             </a:fld>
             <a:endParaRPr lang="en-US" dirty="0"/>
           </a:p>
@@ -6644,6 +6645,65 @@
 </p:sld>
 </file>
 
+<file path=ppt/slides/slide19.xml><?xml version="1.0" encoding="utf-8"?>
+<p:sld xmlns:a="http://schemas.openxmlformats.org/drawingml/2006/main" xmlns:r="http://schemas.openxmlformats.org/officeDocument/2006/relationships" xmlns:p="http://schemas.openxmlformats.org/presentationml/2006/main">
+  <p:cSld>
+    <p:spTree>
+      <p:nvGrpSpPr>
+        <p:cNvPr id="1" name=""/>
+        <p:cNvGrpSpPr/>
+        <p:nvPr/>
+      </p:nvGrpSpPr>
+      <p:grpSpPr>
+        <a:xfrm>
+          <a:off x="0" y="0"/>
+          <a:ext cx="0" cy="0"/>
+          <a:chOff x="0" y="0"/>
+          <a:chExt cx="0" cy="0"/>
+        </a:xfrm>
+      </p:grpSpPr>
+      <p:pic>
+        <p:nvPicPr>
+          <p:cNvPr id="5" name="Content Placeholder 4">
+            <a:extLst>
+              <a:ext uri="{FF2B5EF4-FFF2-40B4-BE49-F238E27FC236}">
+                <a16:creationId xmlns:a16="http://schemas.microsoft.com/office/drawing/2014/main" id="{2D990286-CCCD-457B-B6D3-D90C3AC64029}"/>
+              </a:ext>
+            </a:extLst>
+          </p:cNvPr>
+          <p:cNvPicPr>
+            <a:picLocks noGrp="1" noChangeAspect="1"/>
+          </p:cNvPicPr>
+          <p:nvPr>
+            <p:ph idx="1"/>
+          </p:nvPr>
+        </p:nvPicPr>
+        <p:blipFill>
+          <a:blip r:embed="rId2"/>
+          <a:stretch>
+            <a:fillRect/>
+          </a:stretch>
+        </p:blipFill>
+        <p:spPr>
+          <a:xfrm>
+            <a:off x="944201" y="396531"/>
+            <a:ext cx="10303597" cy="6064937"/>
+          </a:xfrm>
+        </p:spPr>
+      </p:pic>
+    </p:spTree>
+    <p:extLst>
+      <p:ext uri="{BB962C8B-B14F-4D97-AF65-F5344CB8AC3E}">
+        <p14:creationId xmlns:p14="http://schemas.microsoft.com/office/powerpoint/2010/main" val="2065189367"/>
+      </p:ext>
+    </p:extLst>
+  </p:cSld>
+  <p:clrMapOvr>
+    <a:masterClrMapping/>
+  </p:clrMapOvr>
+</p:sld>
+</file>
+
 <file path=ppt/slides/slide2.xml><?xml version="1.0" encoding="utf-8"?>
 <p:sld xmlns:a="http://schemas.openxmlformats.org/drawingml/2006/main" xmlns:r="http://schemas.openxmlformats.org/officeDocument/2006/relationships" xmlns:p="http://schemas.openxmlformats.org/presentationml/2006/main" show="0">
   <p:cSld>

</xml_diff>

<commit_message>
Added figures for seasonal and interannual variability
</commit_message>
<xml_diff>
--- a/Diurnal and Low Frequency Northward Winds off Chile.pptx
+++ b/Diurnal and Low Frequency Northward Winds off Chile.pptx
@@ -5,7 +5,7 @@
     <p:sldMasterId id="2147483852" r:id="rId1"/>
   </p:sldMasterIdLst>
   <p:notesMasterIdLst>
-    <p:notesMasterId r:id="rId21"/>
+    <p:notesMasterId r:id="rId23"/>
   </p:notesMasterIdLst>
   <p:sldIdLst>
     <p:sldId id="256" r:id="rId2"/>
@@ -27,6 +27,8 @@
     <p:sldId id="271" r:id="rId18"/>
     <p:sldId id="272" r:id="rId19"/>
     <p:sldId id="274" r:id="rId20"/>
+    <p:sldId id="275" r:id="rId21"/>
+    <p:sldId id="276" r:id="rId22"/>
   </p:sldIdLst>
   <p:sldSz cx="12192000" cy="6858000"/>
   <p:notesSz cx="6858000" cy="9144000"/>
@@ -391,7 +393,7 @@
           <a:p>
             <a:fld id="{4215EA97-1EC7-4F85-A8C4-247139B65AC9}" type="datetimeFigureOut">
               <a:rPr lang="en-US" smtClean="0"/>
-              <a:t>9/11/2020</a:t>
+              <a:t>9/21/2020</a:t>
             </a:fld>
             <a:endParaRPr lang="en-US"/>
           </a:p>
@@ -1219,6 +1221,303 @@
 </p:notes>
 </file>
 
+<file path=ppt/notesSlides/notesSlide7.xml><?xml version="1.0" encoding="utf-8"?>
+<p:notes xmlns:a="http://schemas.openxmlformats.org/drawingml/2006/main" xmlns:r="http://schemas.openxmlformats.org/officeDocument/2006/relationships" xmlns:p="http://schemas.openxmlformats.org/presentationml/2006/main">
+  <p:cSld>
+    <p:spTree>
+      <p:nvGrpSpPr>
+        <p:cNvPr id="1" name=""/>
+        <p:cNvGrpSpPr/>
+        <p:nvPr/>
+      </p:nvGrpSpPr>
+      <p:grpSpPr>
+        <a:xfrm>
+          <a:off x="0" y="0"/>
+          <a:ext cx="0" cy="0"/>
+          <a:chOff x="0" y="0"/>
+          <a:chExt cx="0" cy="0"/>
+        </a:xfrm>
+      </p:grpSpPr>
+      <p:sp>
+        <p:nvSpPr>
+          <p:cNvPr id="2" name="Slide Image Placeholder 1"/>
+          <p:cNvSpPr>
+            <a:spLocks noGrp="1" noRot="1" noChangeAspect="1"/>
+          </p:cNvSpPr>
+          <p:nvPr>
+            <p:ph type="sldImg"/>
+          </p:nvPr>
+        </p:nvSpPr>
+        <p:spPr/>
+      </p:sp>
+      <p:sp>
+        <p:nvSpPr>
+          <p:cNvPr id="3" name="Notes Placeholder 2"/>
+          <p:cNvSpPr>
+            <a:spLocks noGrp="1"/>
+          </p:cNvSpPr>
+          <p:nvPr>
+            <p:ph type="body" idx="1"/>
+          </p:nvPr>
+        </p:nvSpPr>
+        <p:spPr/>
+        <p:txBody>
+          <a:bodyPr/>
+          <a:lstStyle/>
+          <a:p>
+            <a:r>
+              <a:rPr lang="en-US" dirty="0"/>
+              <a:t>After filtering the same dataset with the same window size (121 samples) and cutoff frequency (1/33 </a:t>
+            </a:r>
+            <a:r>
+              <a:rPr lang="en-US" dirty="0" err="1"/>
+              <a:t>hr</a:t>
+            </a:r>
+            <a:r>
+              <a:rPr lang="en-US" dirty="0"/>
+              <a:t>^-1), plotted low-passed signals against each other over a 1:1 line. Deviation from this is small by sight. The mean residual between the two signals is 0.006 m/s. While the low-passed signal has std of 4.4 m/s, the residual between the filters has a std 0.14 m/s. This difference in variability is at least one order of magnitude smaller than the winds we care about. Thus the </a:t>
+            </a:r>
+            <a:r>
+              <a:rPr lang="en-US" dirty="0" err="1"/>
+              <a:t>Lanczos</a:t>
+            </a:r>
+            <a:r>
+              <a:rPr lang="en-US" dirty="0"/>
+              <a:t> low-pass filter is an appropriate substitute for the pl66 low-pass filter.</a:t>
+            </a:r>
+          </a:p>
+        </p:txBody>
+      </p:sp>
+      <p:sp>
+        <p:nvSpPr>
+          <p:cNvPr id="4" name="Slide Number Placeholder 3"/>
+          <p:cNvSpPr>
+            <a:spLocks noGrp="1"/>
+          </p:cNvSpPr>
+          <p:nvPr>
+            <p:ph type="sldNum" sz="quarter" idx="5"/>
+          </p:nvPr>
+        </p:nvSpPr>
+        <p:spPr/>
+        <p:txBody>
+          <a:bodyPr/>
+          <a:lstStyle/>
+          <a:p>
+            <a:fld id="{28DA9E86-D76E-4569-9EA2-B7BB8F3430A8}" type="slidenum">
+              <a:rPr lang="en-US" smtClean="0"/>
+              <a:t>19</a:t>
+            </a:fld>
+            <a:endParaRPr lang="en-US"/>
+          </a:p>
+        </p:txBody>
+      </p:sp>
+    </p:spTree>
+    <p:extLst>
+      <p:ext uri="{BB962C8B-B14F-4D97-AF65-F5344CB8AC3E}">
+        <p14:creationId xmlns:p14="http://schemas.microsoft.com/office/powerpoint/2010/main" val="992433149"/>
+      </p:ext>
+    </p:extLst>
+  </p:cSld>
+  <p:clrMapOvr>
+    <a:masterClrMapping/>
+  </p:clrMapOvr>
+</p:notes>
+</file>
+
+<file path=ppt/notesSlides/notesSlide8.xml><?xml version="1.0" encoding="utf-8"?>
+<p:notes xmlns:a="http://schemas.openxmlformats.org/drawingml/2006/main" xmlns:r="http://schemas.openxmlformats.org/officeDocument/2006/relationships" xmlns:p="http://schemas.openxmlformats.org/presentationml/2006/main">
+  <p:cSld>
+    <p:spTree>
+      <p:nvGrpSpPr>
+        <p:cNvPr id="1" name=""/>
+        <p:cNvGrpSpPr/>
+        <p:nvPr/>
+      </p:nvGrpSpPr>
+      <p:grpSpPr>
+        <a:xfrm>
+          <a:off x="0" y="0"/>
+          <a:ext cx="0" cy="0"/>
+          <a:chOff x="0" y="0"/>
+          <a:chExt cx="0" cy="0"/>
+        </a:xfrm>
+      </p:grpSpPr>
+      <p:sp>
+        <p:nvSpPr>
+          <p:cNvPr id="2" name="Slide Image Placeholder 1"/>
+          <p:cNvSpPr>
+            <a:spLocks noGrp="1" noRot="1" noChangeAspect="1"/>
+          </p:cNvSpPr>
+          <p:nvPr>
+            <p:ph type="sldImg"/>
+          </p:nvPr>
+        </p:nvSpPr>
+        <p:spPr/>
+      </p:sp>
+      <p:sp>
+        <p:nvSpPr>
+          <p:cNvPr id="3" name="Notes Placeholder 2"/>
+          <p:cNvSpPr>
+            <a:spLocks noGrp="1"/>
+          </p:cNvSpPr>
+          <p:nvPr>
+            <p:ph type="body" idx="1"/>
+          </p:nvPr>
+        </p:nvSpPr>
+        <p:spPr/>
+        <p:txBody>
+          <a:bodyPr/>
+          <a:lstStyle/>
+          <a:p>
+            <a:r>
+              <a:rPr lang="en-US" dirty="0"/>
+              <a:t>Typically the monthly mean of northward component of 10-m wind velocity is consistent over the ~10.5 year record. The biggest jumps in means have occurred in May through August.</a:t>
+            </a:r>
+          </a:p>
+        </p:txBody>
+      </p:sp>
+      <p:sp>
+        <p:nvSpPr>
+          <p:cNvPr id="4" name="Slide Number Placeholder 3"/>
+          <p:cNvSpPr>
+            <a:spLocks noGrp="1"/>
+          </p:cNvSpPr>
+          <p:nvPr>
+            <p:ph type="sldNum" sz="quarter" idx="5"/>
+          </p:nvPr>
+        </p:nvSpPr>
+        <p:spPr/>
+        <p:txBody>
+          <a:bodyPr/>
+          <a:lstStyle/>
+          <a:p>
+            <a:fld id="{28DA9E86-D76E-4569-9EA2-B7BB8F3430A8}" type="slidenum">
+              <a:rPr lang="en-US" smtClean="0"/>
+              <a:t>20</a:t>
+            </a:fld>
+            <a:endParaRPr lang="en-US"/>
+          </a:p>
+        </p:txBody>
+      </p:sp>
+    </p:spTree>
+    <p:extLst>
+      <p:ext uri="{BB962C8B-B14F-4D97-AF65-F5344CB8AC3E}">
+        <p14:creationId xmlns:p14="http://schemas.microsoft.com/office/powerpoint/2010/main" val="3627669740"/>
+      </p:ext>
+    </p:extLst>
+  </p:cSld>
+  <p:clrMapOvr>
+    <a:masterClrMapping/>
+  </p:clrMapOvr>
+</p:notes>
+</file>
+
+<file path=ppt/notesSlides/notesSlide9.xml><?xml version="1.0" encoding="utf-8"?>
+<p:notes xmlns:a="http://schemas.openxmlformats.org/drawingml/2006/main" xmlns:r="http://schemas.openxmlformats.org/officeDocument/2006/relationships" xmlns:p="http://schemas.openxmlformats.org/presentationml/2006/main">
+  <p:cSld>
+    <p:spTree>
+      <p:nvGrpSpPr>
+        <p:cNvPr id="1" name=""/>
+        <p:cNvGrpSpPr/>
+        <p:nvPr/>
+      </p:nvGrpSpPr>
+      <p:grpSpPr>
+        <a:xfrm>
+          <a:off x="0" y="0"/>
+          <a:ext cx="0" cy="0"/>
+          <a:chOff x="0" y="0"/>
+          <a:chExt cx="0" cy="0"/>
+        </a:xfrm>
+      </p:grpSpPr>
+      <p:sp>
+        <p:nvSpPr>
+          <p:cNvPr id="2" name="Slide Image Placeholder 1"/>
+          <p:cNvSpPr>
+            <a:spLocks noGrp="1" noRot="1" noChangeAspect="1"/>
+          </p:cNvSpPr>
+          <p:nvPr>
+            <p:ph type="sldImg"/>
+          </p:nvPr>
+        </p:nvSpPr>
+        <p:spPr/>
+      </p:sp>
+      <p:sp>
+        <p:nvSpPr>
+          <p:cNvPr id="3" name="Notes Placeholder 2"/>
+          <p:cNvSpPr>
+            <a:spLocks noGrp="1"/>
+          </p:cNvSpPr>
+          <p:nvPr>
+            <p:ph type="body" idx="1"/>
+          </p:nvPr>
+        </p:nvSpPr>
+        <p:spPr/>
+        <p:txBody>
+          <a:bodyPr/>
+          <a:lstStyle/>
+          <a:p>
+            <a:r>
+              <a:rPr lang="en-US" dirty="0"/>
+              <a:t>The monthly mean northward component of wind velocity stays poleward (upwelling favorable) year-round off Pt. </a:t>
+            </a:r>
+            <a:r>
+              <a:rPr lang="en-US" dirty="0" err="1"/>
+              <a:t>Lengua</a:t>
+            </a:r>
+            <a:r>
+              <a:rPr lang="en-US" dirty="0"/>
+              <a:t> de </a:t>
+            </a:r>
+            <a:r>
+              <a:rPr lang="en-US" dirty="0" err="1"/>
+              <a:t>Vaca</a:t>
+            </a:r>
+            <a:r>
+              <a:rPr lang="en-US" dirty="0"/>
+              <a:t>. We see the weakest upwelling-favorable winds, and greatest variability, in May and June (maybe through July) which is austral winter. (more frequent storms?) In this plot black points and error bars are mean monthly avg and standard deviation over the whole record. The red boxes are CI’s for the mean of the monthly means. N* is 11 for January through May, which may explain larger boxes in </a:t>
+            </a:r>
+            <a:r>
+              <a:rPr lang="en-US"/>
+              <a:t>the second half of the year.</a:t>
+            </a:r>
+          </a:p>
+        </p:txBody>
+      </p:sp>
+      <p:sp>
+        <p:nvSpPr>
+          <p:cNvPr id="4" name="Slide Number Placeholder 3"/>
+          <p:cNvSpPr>
+            <a:spLocks noGrp="1"/>
+          </p:cNvSpPr>
+          <p:nvPr>
+            <p:ph type="sldNum" sz="quarter" idx="5"/>
+          </p:nvPr>
+        </p:nvSpPr>
+        <p:spPr/>
+        <p:txBody>
+          <a:bodyPr/>
+          <a:lstStyle/>
+          <a:p>
+            <a:fld id="{28DA9E86-D76E-4569-9EA2-B7BB8F3430A8}" type="slidenum">
+              <a:rPr lang="en-US" smtClean="0"/>
+              <a:t>21</a:t>
+            </a:fld>
+            <a:endParaRPr lang="en-US"/>
+          </a:p>
+        </p:txBody>
+      </p:sp>
+    </p:spTree>
+    <p:extLst>
+      <p:ext uri="{BB962C8B-B14F-4D97-AF65-F5344CB8AC3E}">
+        <p14:creationId xmlns:p14="http://schemas.microsoft.com/office/powerpoint/2010/main" val="1224572469"/>
+      </p:ext>
+    </p:extLst>
+  </p:cSld>
+  <p:clrMapOvr>
+    <a:masterClrMapping/>
+  </p:clrMapOvr>
+</p:notes>
+</file>
+
 <file path=ppt/slideLayouts/slideLayout1.xml><?xml version="1.0" encoding="utf-8"?>
 <p:sldLayout xmlns:a="http://schemas.openxmlformats.org/drawingml/2006/main" xmlns:r="http://schemas.openxmlformats.org/officeDocument/2006/relationships" xmlns:p="http://schemas.openxmlformats.org/presentationml/2006/main" type="title" preserve="1">
   <p:cSld name="Title Slide">
@@ -1367,7 +1666,7 @@
             <a:fld id="{5586B75A-687E-405C-8A0B-8D00578BA2C3}" type="datetimeFigureOut">
               <a:rPr lang="en-US" smtClean="0"/>
               <a:pPr/>
-              <a:t>9/11/2020</a:t>
+              <a:t>9/21/2020</a:t>
             </a:fld>
             <a:endParaRPr lang="en-US" dirty="0"/>
           </a:p>
@@ -1567,7 +1866,7 @@
             <a:fld id="{5586B75A-687E-405C-8A0B-8D00578BA2C3}" type="datetimeFigureOut">
               <a:rPr lang="en-US" smtClean="0"/>
               <a:pPr/>
-              <a:t>9/11/2020</a:t>
+              <a:t>9/21/2020</a:t>
             </a:fld>
             <a:endParaRPr lang="en-US" dirty="0"/>
           </a:p>
@@ -1777,7 +2076,7 @@
             <a:fld id="{5586B75A-687E-405C-8A0B-8D00578BA2C3}" type="datetimeFigureOut">
               <a:rPr lang="en-US" smtClean="0"/>
               <a:pPr/>
-              <a:t>9/11/2020</a:t>
+              <a:t>9/21/2020</a:t>
             </a:fld>
             <a:endParaRPr lang="en-US" dirty="0"/>
           </a:p>
@@ -1977,7 +2276,7 @@
             <a:fld id="{5586B75A-687E-405C-8A0B-8D00578BA2C3}" type="datetimeFigureOut">
               <a:rPr lang="en-US" smtClean="0"/>
               <a:pPr/>
-              <a:t>9/11/2020</a:t>
+              <a:t>9/21/2020</a:t>
             </a:fld>
             <a:endParaRPr lang="en-US" dirty="0"/>
           </a:p>
@@ -2254,7 +2553,7 @@
             <a:fld id="{5586B75A-687E-405C-8A0B-8D00578BA2C3}" type="datetimeFigureOut">
               <a:rPr lang="en-US" smtClean="0"/>
               <a:pPr/>
-              <a:t>9/11/2020</a:t>
+              <a:t>9/21/2020</a:t>
             </a:fld>
             <a:endParaRPr lang="en-US" dirty="0"/>
           </a:p>
@@ -2521,7 +2820,7 @@
             <a:fld id="{5586B75A-687E-405C-8A0B-8D00578BA2C3}" type="datetimeFigureOut">
               <a:rPr lang="en-US" smtClean="0"/>
               <a:pPr/>
-              <a:t>9/11/2020</a:t>
+              <a:t>9/21/2020</a:t>
             </a:fld>
             <a:endParaRPr lang="en-US" dirty="0"/>
           </a:p>
@@ -2935,7 +3234,7 @@
             <a:fld id="{5586B75A-687E-405C-8A0B-8D00578BA2C3}" type="datetimeFigureOut">
               <a:rPr lang="en-US" smtClean="0"/>
               <a:pPr/>
-              <a:t>9/11/2020</a:t>
+              <a:t>9/21/2020</a:t>
             </a:fld>
             <a:endParaRPr lang="en-US" dirty="0"/>
           </a:p>
@@ -3078,7 +3377,7 @@
             <a:fld id="{5586B75A-687E-405C-8A0B-8D00578BA2C3}" type="datetimeFigureOut">
               <a:rPr lang="en-US" smtClean="0"/>
               <a:pPr/>
-              <a:t>9/11/2020</a:t>
+              <a:t>9/21/2020</a:t>
             </a:fld>
             <a:endParaRPr lang="en-US" dirty="0"/>
           </a:p>
@@ -3193,7 +3492,7 @@
             <a:fld id="{5586B75A-687E-405C-8A0B-8D00578BA2C3}" type="datetimeFigureOut">
               <a:rPr lang="en-US" smtClean="0"/>
               <a:pPr/>
-              <a:t>9/11/2020</a:t>
+              <a:t>9/21/2020</a:t>
             </a:fld>
             <a:endParaRPr lang="en-US" dirty="0"/>
           </a:p>
@@ -3506,7 +3805,7 @@
             <a:fld id="{5586B75A-687E-405C-8A0B-8D00578BA2C3}" type="datetimeFigureOut">
               <a:rPr lang="en-US" smtClean="0"/>
               <a:pPr/>
-              <a:t>9/11/2020</a:t>
+              <a:t>9/21/2020</a:t>
             </a:fld>
             <a:endParaRPr lang="en-US" dirty="0"/>
           </a:p>
@@ -3796,7 +4095,7 @@
             <a:fld id="{5586B75A-687E-405C-8A0B-8D00578BA2C3}" type="datetimeFigureOut">
               <a:rPr lang="en-US" smtClean="0"/>
               <a:pPr/>
-              <a:t>9/11/2020</a:t>
+              <a:t>9/21/2020</a:t>
             </a:fld>
             <a:endParaRPr lang="en-US" dirty="0"/>
           </a:p>
@@ -4045,7 +4344,7 @@
             <a:fld id="{5586B75A-687E-405C-8A0B-8D00578BA2C3}" type="datetimeFigureOut">
               <a:rPr lang="en-US" smtClean="0"/>
               <a:pPr/>
-              <a:t>9/11/2020</a:t>
+              <a:t>9/21/2020</a:t>
             </a:fld>
             <a:endParaRPr lang="en-US" dirty="0"/>
           </a:p>
@@ -6679,18 +6978,61 @@
           </p:nvPr>
         </p:nvPicPr>
         <p:blipFill>
-          <a:blip r:embed="rId2"/>
+          <a:blip r:embed="rId3"/>
           <a:stretch>
             <a:fillRect/>
           </a:stretch>
         </p:blipFill>
         <p:spPr>
           <a:xfrm>
-            <a:off x="944201" y="396531"/>
-            <a:ext cx="10303597" cy="6064937"/>
+            <a:off x="1561631" y="1097281"/>
+            <a:ext cx="9061327" cy="5333708"/>
           </a:xfrm>
         </p:spPr>
       </p:pic>
+      <p:sp>
+        <p:nvSpPr>
+          <p:cNvPr id="2" name="TextBox 1">
+            <a:extLst>
+              <a:ext uri="{FF2B5EF4-FFF2-40B4-BE49-F238E27FC236}">
+                <a16:creationId xmlns:a16="http://schemas.microsoft.com/office/drawing/2014/main" id="{69139751-6D7F-44CD-B94D-AACCCA8C80A2}"/>
+              </a:ext>
+            </a:extLst>
+          </p:cNvPr>
+          <p:cNvSpPr txBox="1"/>
+          <p:nvPr/>
+        </p:nvSpPr>
+        <p:spPr>
+          <a:xfrm>
+            <a:off x="640080" y="320040"/>
+            <a:ext cx="11170920" cy="523220"/>
+          </a:xfrm>
+          <a:prstGeom prst="rect">
+            <a:avLst/>
+          </a:prstGeom>
+          <a:noFill/>
+        </p:spPr>
+        <p:txBody>
+          <a:bodyPr wrap="square" rtlCol="0">
+            <a:spAutoFit/>
+          </a:bodyPr>
+          <a:lstStyle/>
+          <a:p>
+            <a:r>
+              <a:rPr lang="en-US" sz="2800" dirty="0"/>
+              <a:t>Does the </a:t>
+            </a:r>
+            <a:r>
+              <a:rPr lang="en-US" sz="2800" dirty="0" err="1"/>
+              <a:t>Lanczos</a:t>
+            </a:r>
+            <a:r>
+              <a:rPr lang="en-US" sz="2800" dirty="0"/>
+              <a:t> filter work approximately the same as the pl66 filter? </a:t>
+            </a:r>
+          </a:p>
+        </p:txBody>
+      </p:sp>
     </p:spTree>
     <p:extLst>
       <p:ext uri="{BB962C8B-B14F-4D97-AF65-F5344CB8AC3E}">
@@ -6794,6 +7136,180 @@
     <p:extLst>
       <p:ext uri="{BB962C8B-B14F-4D97-AF65-F5344CB8AC3E}">
         <p14:creationId xmlns:p14="http://schemas.microsoft.com/office/powerpoint/2010/main" val="3876563354"/>
+      </p:ext>
+    </p:extLst>
+  </p:cSld>
+  <p:clrMapOvr>
+    <a:masterClrMapping/>
+  </p:clrMapOvr>
+</p:sld>
+</file>
+
+<file path=ppt/slides/slide20.xml><?xml version="1.0" encoding="utf-8"?>
+<p:sld xmlns:a="http://schemas.openxmlformats.org/drawingml/2006/main" xmlns:r="http://schemas.openxmlformats.org/officeDocument/2006/relationships" xmlns:p="http://schemas.openxmlformats.org/presentationml/2006/main">
+  <p:cSld>
+    <p:spTree>
+      <p:nvGrpSpPr>
+        <p:cNvPr id="1" name=""/>
+        <p:cNvGrpSpPr/>
+        <p:nvPr/>
+      </p:nvGrpSpPr>
+      <p:grpSpPr>
+        <a:xfrm>
+          <a:off x="0" y="0"/>
+          <a:ext cx="0" cy="0"/>
+          <a:chOff x="0" y="0"/>
+          <a:chExt cx="0" cy="0"/>
+        </a:xfrm>
+      </p:grpSpPr>
+      <p:sp>
+        <p:nvSpPr>
+          <p:cNvPr id="2" name="Title 1">
+            <a:extLst>
+              <a:ext uri="{FF2B5EF4-FFF2-40B4-BE49-F238E27FC236}">
+                <a16:creationId xmlns:a16="http://schemas.microsoft.com/office/drawing/2014/main" id="{664DE7E6-05AC-4A7A-8B7F-BF455F6BCFAF}"/>
+              </a:ext>
+            </a:extLst>
+          </p:cNvPr>
+          <p:cNvSpPr>
+            <a:spLocks noGrp="1"/>
+          </p:cNvSpPr>
+          <p:nvPr>
+            <p:ph type="title"/>
+          </p:nvPr>
+        </p:nvSpPr>
+        <p:spPr/>
+        <p:txBody>
+          <a:bodyPr/>
+          <a:lstStyle/>
+          <a:p>
+            <a:r>
+              <a:rPr lang="en-US" dirty="0"/>
+              <a:t>What is the interannual variability of monthly means of northward 10-m wind velocity?</a:t>
+            </a:r>
+          </a:p>
+        </p:txBody>
+      </p:sp>
+      <p:pic>
+        <p:nvPicPr>
+          <p:cNvPr id="5" name="Content Placeholder 4">
+            <a:extLst>
+              <a:ext uri="{FF2B5EF4-FFF2-40B4-BE49-F238E27FC236}">
+                <a16:creationId xmlns:a16="http://schemas.microsoft.com/office/drawing/2014/main" id="{E2C136EB-65A3-405F-B256-083C99844579}"/>
+              </a:ext>
+            </a:extLst>
+          </p:cNvPr>
+          <p:cNvPicPr>
+            <a:picLocks noGrp="1" noChangeAspect="1"/>
+          </p:cNvPicPr>
+          <p:nvPr>
+            <p:ph idx="1"/>
+          </p:nvPr>
+        </p:nvPicPr>
+        <p:blipFill>
+          <a:blip r:embed="rId3"/>
+          <a:stretch>
+            <a:fillRect/>
+          </a:stretch>
+        </p:blipFill>
+        <p:spPr>
+          <a:xfrm>
+            <a:off x="1075267" y="1690688"/>
+            <a:ext cx="10041466" cy="4895215"/>
+          </a:xfrm>
+        </p:spPr>
+      </p:pic>
+    </p:spTree>
+    <p:extLst>
+      <p:ext uri="{BB962C8B-B14F-4D97-AF65-F5344CB8AC3E}">
+        <p14:creationId xmlns:p14="http://schemas.microsoft.com/office/powerpoint/2010/main" val="1375392242"/>
+      </p:ext>
+    </p:extLst>
+  </p:cSld>
+  <p:clrMapOvr>
+    <a:masterClrMapping/>
+  </p:clrMapOvr>
+</p:sld>
+</file>
+
+<file path=ppt/slides/slide21.xml><?xml version="1.0" encoding="utf-8"?>
+<p:sld xmlns:a="http://schemas.openxmlformats.org/drawingml/2006/main" xmlns:r="http://schemas.openxmlformats.org/officeDocument/2006/relationships" xmlns:p="http://schemas.openxmlformats.org/presentationml/2006/main">
+  <p:cSld>
+    <p:spTree>
+      <p:nvGrpSpPr>
+        <p:cNvPr id="1" name=""/>
+        <p:cNvGrpSpPr/>
+        <p:nvPr/>
+      </p:nvGrpSpPr>
+      <p:grpSpPr>
+        <a:xfrm>
+          <a:off x="0" y="0"/>
+          <a:ext cx="0" cy="0"/>
+          <a:chOff x="0" y="0"/>
+          <a:chExt cx="0" cy="0"/>
+        </a:xfrm>
+      </p:grpSpPr>
+      <p:sp>
+        <p:nvSpPr>
+          <p:cNvPr id="2" name="Title 1">
+            <a:extLst>
+              <a:ext uri="{FF2B5EF4-FFF2-40B4-BE49-F238E27FC236}">
+                <a16:creationId xmlns:a16="http://schemas.microsoft.com/office/drawing/2014/main" id="{EACADA98-DF65-4EEE-925B-4AD8EB8F0B55}"/>
+              </a:ext>
+            </a:extLst>
+          </p:cNvPr>
+          <p:cNvSpPr>
+            <a:spLocks noGrp="1"/>
+          </p:cNvSpPr>
+          <p:nvPr>
+            <p:ph type="title"/>
+          </p:nvPr>
+        </p:nvSpPr>
+        <p:spPr/>
+        <p:txBody>
+          <a:bodyPr/>
+          <a:lstStyle/>
+          <a:p>
+            <a:r>
+              <a:rPr lang="en-US" dirty="0"/>
+              <a:t>How do monthly means of northward 10-m wind velocity change seasonally?</a:t>
+            </a:r>
+          </a:p>
+        </p:txBody>
+      </p:sp>
+      <p:pic>
+        <p:nvPicPr>
+          <p:cNvPr id="5" name="Content Placeholder 4">
+            <a:extLst>
+              <a:ext uri="{FF2B5EF4-FFF2-40B4-BE49-F238E27FC236}">
+                <a16:creationId xmlns:a16="http://schemas.microsoft.com/office/drawing/2014/main" id="{BC611947-499A-40BC-8C86-5398814B1BA2}"/>
+              </a:ext>
+            </a:extLst>
+          </p:cNvPr>
+          <p:cNvPicPr>
+            <a:picLocks noGrp="1" noChangeAspect="1"/>
+          </p:cNvPicPr>
+          <p:nvPr>
+            <p:ph idx="1"/>
+          </p:nvPr>
+        </p:nvPicPr>
+        <p:blipFill>
+          <a:blip r:embed="rId3"/>
+          <a:stretch>
+            <a:fillRect/>
+          </a:stretch>
+        </p:blipFill>
+        <p:spPr>
+          <a:xfrm>
+            <a:off x="1706735" y="1825625"/>
+            <a:ext cx="8778530" cy="4351338"/>
+          </a:xfrm>
+        </p:spPr>
+      </p:pic>
+    </p:spTree>
+    <p:extLst>
+      <p:ext uri="{BB962C8B-B14F-4D97-AF65-F5344CB8AC3E}">
+        <p14:creationId xmlns:p14="http://schemas.microsoft.com/office/powerpoint/2010/main" val="2493555615"/>
       </p:ext>
     </p:extLst>
   </p:cSld>

</xml_diff>

<commit_message>
Adding Constitucion SST figures and analysis scripts
</commit_message>
<xml_diff>
--- a/Diurnal and Low Frequency Northward Winds off Chile.pptx
+++ b/Diurnal and Low Frequency Northward Winds off Chile.pptx
@@ -393,7 +393,7 @@
           <a:p>
             <a:fld id="{4215EA97-1EC7-4F85-A8C4-247139B65AC9}" type="datetimeFigureOut">
               <a:rPr lang="en-US" smtClean="0"/>
-              <a:t>9/21/2020</a:t>
+              <a:t>9/24/2020</a:t>
             </a:fld>
             <a:endParaRPr lang="en-US"/>
           </a:p>
@@ -1473,11 +1473,13 @@
             </a:r>
             <a:r>
               <a:rPr lang="en-US" dirty="0"/>
-              <a:t>. We see the weakest upwelling-favorable winds, and greatest variability, in May and June (maybe through July) which is austral winter. (more frequent storms?) In this plot black points and error bars are mean monthly avg and standard deviation over the whole record. The red boxes are CI’s for the mean of the monthly means. N* is 11 for January through May, which may explain larger boxes in </a:t>
-            </a:r>
-            <a:r>
-              <a:rPr lang="en-US"/>
-              <a:t>the second half of the year.</a:t>
+              <a:t>. We see the weakest upwelling-favorable winds, and greatest variability, in May and June (maybe through July) which is austral winter. (more frequent storms?) In this plot black points and error bars are mean monthly avg and standard deviation over the whole record. The red boxes are CI’s for the mean of the monthly means. N* is 11 for January through May, which may explain larger boxes in the second half of the year.</a:t>
+            </a:r>
+          </a:p>
+          <a:p>
+            <a:r>
+              <a:rPr lang="en-US" dirty="0"/>
+              <a:t>Black dots and error bars are mean +/- std of monthly means from previous plots</a:t>
             </a:r>
           </a:p>
         </p:txBody>
@@ -1666,7 +1668,7 @@
             <a:fld id="{5586B75A-687E-405C-8A0B-8D00578BA2C3}" type="datetimeFigureOut">
               <a:rPr lang="en-US" smtClean="0"/>
               <a:pPr/>
-              <a:t>9/21/2020</a:t>
+              <a:t>9/24/2020</a:t>
             </a:fld>
             <a:endParaRPr lang="en-US" dirty="0"/>
           </a:p>
@@ -1866,7 +1868,7 @@
             <a:fld id="{5586B75A-687E-405C-8A0B-8D00578BA2C3}" type="datetimeFigureOut">
               <a:rPr lang="en-US" smtClean="0"/>
               <a:pPr/>
-              <a:t>9/21/2020</a:t>
+              <a:t>9/24/2020</a:t>
             </a:fld>
             <a:endParaRPr lang="en-US" dirty="0"/>
           </a:p>
@@ -2076,7 +2078,7 @@
             <a:fld id="{5586B75A-687E-405C-8A0B-8D00578BA2C3}" type="datetimeFigureOut">
               <a:rPr lang="en-US" smtClean="0"/>
               <a:pPr/>
-              <a:t>9/21/2020</a:t>
+              <a:t>9/24/2020</a:t>
             </a:fld>
             <a:endParaRPr lang="en-US" dirty="0"/>
           </a:p>
@@ -2276,7 +2278,7 @@
             <a:fld id="{5586B75A-687E-405C-8A0B-8D00578BA2C3}" type="datetimeFigureOut">
               <a:rPr lang="en-US" smtClean="0"/>
               <a:pPr/>
-              <a:t>9/21/2020</a:t>
+              <a:t>9/24/2020</a:t>
             </a:fld>
             <a:endParaRPr lang="en-US" dirty="0"/>
           </a:p>
@@ -2553,7 +2555,7 @@
             <a:fld id="{5586B75A-687E-405C-8A0B-8D00578BA2C3}" type="datetimeFigureOut">
               <a:rPr lang="en-US" smtClean="0"/>
               <a:pPr/>
-              <a:t>9/21/2020</a:t>
+              <a:t>9/24/2020</a:t>
             </a:fld>
             <a:endParaRPr lang="en-US" dirty="0"/>
           </a:p>
@@ -2820,7 +2822,7 @@
             <a:fld id="{5586B75A-687E-405C-8A0B-8D00578BA2C3}" type="datetimeFigureOut">
               <a:rPr lang="en-US" smtClean="0"/>
               <a:pPr/>
-              <a:t>9/21/2020</a:t>
+              <a:t>9/24/2020</a:t>
             </a:fld>
             <a:endParaRPr lang="en-US" dirty="0"/>
           </a:p>
@@ -3234,7 +3236,7 @@
             <a:fld id="{5586B75A-687E-405C-8A0B-8D00578BA2C3}" type="datetimeFigureOut">
               <a:rPr lang="en-US" smtClean="0"/>
               <a:pPr/>
-              <a:t>9/21/2020</a:t>
+              <a:t>9/24/2020</a:t>
             </a:fld>
             <a:endParaRPr lang="en-US" dirty="0"/>
           </a:p>
@@ -3377,7 +3379,7 @@
             <a:fld id="{5586B75A-687E-405C-8A0B-8D00578BA2C3}" type="datetimeFigureOut">
               <a:rPr lang="en-US" smtClean="0"/>
               <a:pPr/>
-              <a:t>9/21/2020</a:t>
+              <a:t>9/24/2020</a:t>
             </a:fld>
             <a:endParaRPr lang="en-US" dirty="0"/>
           </a:p>
@@ -3492,7 +3494,7 @@
             <a:fld id="{5586B75A-687E-405C-8A0B-8D00578BA2C3}" type="datetimeFigureOut">
               <a:rPr lang="en-US" smtClean="0"/>
               <a:pPr/>
-              <a:t>9/21/2020</a:t>
+              <a:t>9/24/2020</a:t>
             </a:fld>
             <a:endParaRPr lang="en-US" dirty="0"/>
           </a:p>
@@ -3805,7 +3807,7 @@
             <a:fld id="{5586B75A-687E-405C-8A0B-8D00578BA2C3}" type="datetimeFigureOut">
               <a:rPr lang="en-US" smtClean="0"/>
               <a:pPr/>
-              <a:t>9/21/2020</a:t>
+              <a:t>9/24/2020</a:t>
             </a:fld>
             <a:endParaRPr lang="en-US" dirty="0"/>
           </a:p>
@@ -4095,7 +4097,7 @@
             <a:fld id="{5586B75A-687E-405C-8A0B-8D00578BA2C3}" type="datetimeFigureOut">
               <a:rPr lang="en-US" smtClean="0"/>
               <a:pPr/>
-              <a:t>9/21/2020</a:t>
+              <a:t>9/24/2020</a:t>
             </a:fld>
             <a:endParaRPr lang="en-US" dirty="0"/>
           </a:p>
@@ -4344,7 +4346,7 @@
             <a:fld id="{5586B75A-687E-405C-8A0B-8D00578BA2C3}" type="datetimeFigureOut">
               <a:rPr lang="en-US" smtClean="0"/>
               <a:pPr/>
-              <a:t>9/21/2020</a:t>
+              <a:t>9/24/2020</a:t>
             </a:fld>
             <a:endParaRPr lang="en-US" dirty="0"/>
           </a:p>

</xml_diff>